<commit_message>
added topics to discuss
</commit_message>
<xml_diff>
--- a/fsharp-introduction/FSharpForWeb.pptx
+++ b/fsharp-introduction/FSharpForWeb.pptx
@@ -5,20 +5,28 @@
     <p:sldMasterId id="2147483674" r:id="rId1"/>
   </p:sldMasterIdLst>
   <p:notesMasterIdLst>
-    <p:notesMasterId r:id="rId13"/>
+    <p:notesMasterId r:id="rId21"/>
   </p:notesMasterIdLst>
   <p:sldIdLst>
     <p:sldId id="256" r:id="rId2"/>
     <p:sldId id="257" r:id="rId3"/>
-    <p:sldId id="258" r:id="rId4"/>
+    <p:sldId id="270" r:id="rId4"/>
     <p:sldId id="261" r:id="rId5"/>
     <p:sldId id="262" r:id="rId6"/>
     <p:sldId id="263" r:id="rId7"/>
     <p:sldId id="264" r:id="rId8"/>
     <p:sldId id="266" r:id="rId9"/>
     <p:sldId id="265" r:id="rId10"/>
-    <p:sldId id="259" r:id="rId11"/>
-    <p:sldId id="260" r:id="rId12"/>
+    <p:sldId id="268" r:id="rId11"/>
+    <p:sldId id="267" r:id="rId12"/>
+    <p:sldId id="269" r:id="rId13"/>
+    <p:sldId id="259" r:id="rId14"/>
+    <p:sldId id="271" r:id="rId15"/>
+    <p:sldId id="272" r:id="rId16"/>
+    <p:sldId id="273" r:id="rId17"/>
+    <p:sldId id="274" r:id="rId18"/>
+    <p:sldId id="275" r:id="rId19"/>
+    <p:sldId id="260" r:id="rId20"/>
   </p:sldIdLst>
   <p:sldSz cx="9144000" cy="5143500" type="screen16x9"/>
   <p:notesSz cx="6858000" cy="9144000"/>
@@ -124,22 +132,30 @@
           <p14:sldIdLst>
             <p14:sldId id="256"/>
             <p14:sldId id="257"/>
+            <p14:sldId id="270"/>
           </p14:sldIdLst>
         </p14:section>
         <p14:section name="Introduction" id="{23416C46-43E7-48C0-A659-98242C91892C}">
           <p14:sldIdLst>
-            <p14:sldId id="258"/>
             <p14:sldId id="261"/>
             <p14:sldId id="262"/>
             <p14:sldId id="263"/>
             <p14:sldId id="264"/>
             <p14:sldId id="266"/>
             <p14:sldId id="265"/>
+            <p14:sldId id="268"/>
+            <p14:sldId id="267"/>
+            <p14:sldId id="269"/>
           </p14:sldIdLst>
         </p14:section>
         <p14:section name="Giraffe" id="{64C0EE2C-C094-4A3C-99FB-9F06F218C6D7}">
           <p14:sldIdLst>
             <p14:sldId id="259"/>
+            <p14:sldId id="271"/>
+            <p14:sldId id="272"/>
+            <p14:sldId id="273"/>
+            <p14:sldId id="274"/>
+            <p14:sldId id="275"/>
           </p14:sldIdLst>
         </p14:section>
         <p14:section name="Fable" id="{E37A1A4B-01DF-4EE2-AF61-003D4155BFAB}">
@@ -253,7 +269,7 @@
           <a:p>
             <a:fld id="{1EA7D9FF-D308-E049-8980-28E91E61D0E5}" type="datetimeFigureOut">
               <a:rPr lang="en-US" smtClean="0"/>
-              <a:t>8/6/2017</a:t>
+              <a:t>8/29/2017</a:t>
             </a:fld>
             <a:endParaRPr lang="en-US"/>
           </a:p>
@@ -648,7 +664,282 @@
           <a:bodyPr/>
           <a:lstStyle/>
           <a:p>
-            <a:endParaRPr lang="LID4096" dirty="0"/>
+            <a:r>
+              <a:rPr lang="en-US" dirty="0"/>
+              <a:t>Demo:</a:t>
+            </a:r>
+          </a:p>
+          <a:p>
+            <a:endParaRPr lang="en-US" dirty="0"/>
+          </a:p>
+          <a:p>
+            <a:r>
+              <a:rPr lang="en-US" dirty="0"/>
+              <a:t>Create a new console application:</a:t>
+            </a:r>
+          </a:p>
+          <a:p>
+            <a:endParaRPr lang="en-US" dirty="0"/>
+          </a:p>
+          <a:p>
+            <a:r>
+              <a:rPr lang="en-US" dirty="0"/>
+              <a:t>PS C:\temp&gt; </a:t>
+            </a:r>
+            <a:r>
+              <a:rPr lang="en-US" dirty="0" err="1"/>
+              <a:t>dotnet</a:t>
+            </a:r>
+            <a:r>
+              <a:rPr lang="en-US" dirty="0"/>
+              <a:t> new console -</a:t>
+            </a:r>
+            <a:r>
+              <a:rPr lang="en-US" dirty="0" err="1"/>
+              <a:t>lang</a:t>
+            </a:r>
+            <a:r>
+              <a:rPr lang="en-US" dirty="0"/>
+              <a:t> F# -n HelloWorld</a:t>
+            </a:r>
+          </a:p>
+          <a:p>
+            <a:endParaRPr lang="en-US" dirty="0"/>
+          </a:p>
+          <a:p>
+            <a:r>
+              <a:rPr lang="en-US" dirty="0"/>
+              <a:t>Open in rider, explain </a:t>
+            </a:r>
+            <a:r>
+              <a:rPr lang="en-US" dirty="0" err="1"/>
+              <a:t>Program.fs</a:t>
+            </a:r>
+            <a:endParaRPr lang="en-US" dirty="0"/>
+          </a:p>
+          <a:p>
+            <a:endParaRPr lang="en-US" dirty="0"/>
+          </a:p>
+          <a:p>
+            <a:r>
+              <a:rPr lang="en-US" dirty="0"/>
+              <a:t>Do a </a:t>
+            </a:r>
+            <a:r>
+              <a:rPr lang="en-US" dirty="0" err="1"/>
+              <a:t>dotnet</a:t>
+            </a:r>
+            <a:r>
+              <a:rPr lang="en-US" dirty="0"/>
+              <a:t> publish and open </a:t>
+            </a:r>
+            <a:r>
+              <a:rPr lang="en-US" dirty="0" err="1"/>
+              <a:t>dll</a:t>
+            </a:r>
+            <a:r>
+              <a:rPr lang="en-US" dirty="0"/>
+              <a:t> in </a:t>
+            </a:r>
+            <a:r>
+              <a:rPr lang="en-US" dirty="0" err="1"/>
+              <a:t>dotpeek</a:t>
+            </a:r>
+            <a:r>
+              <a:rPr lang="en-US" dirty="0"/>
+              <a:t>. Clue is that the compiled F# needs the </a:t>
+            </a:r>
+            <a:r>
+              <a:rPr lang="en-US" dirty="0" err="1"/>
+              <a:t>Fsharp</a:t>
+            </a:r>
+            <a:r>
+              <a:rPr lang="en-US" dirty="0"/>
+              <a:t> core </a:t>
+            </a:r>
+            <a:r>
+              <a:rPr lang="en-US" dirty="0" err="1"/>
+              <a:t>dll</a:t>
+            </a:r>
+            <a:r>
+              <a:rPr lang="en-US" dirty="0"/>
+              <a:t> to run.</a:t>
+            </a:r>
+          </a:p>
+          <a:p>
+            <a:endParaRPr lang="en-US" dirty="0"/>
+          </a:p>
+          <a:p>
+            <a:r>
+              <a:rPr lang="en-US" dirty="0"/>
+              <a:t>Change </a:t>
+            </a:r>
+            <a:r>
+              <a:rPr lang="en-US" dirty="0" err="1"/>
+              <a:t>Program.fs</a:t>
+            </a:r>
+            <a:r>
+              <a:rPr lang="en-US" dirty="0"/>
+              <a:t> to</a:t>
+            </a:r>
+          </a:p>
+          <a:p>
+            <a:endParaRPr lang="en-US" dirty="0"/>
+          </a:p>
+          <a:p>
+            <a:r>
+              <a:rPr lang="en-US" dirty="0">
+                <a:effectLst/>
+              </a:rPr>
+              <a:t>[&lt;</a:t>
+            </a:r>
+            <a:r>
+              <a:rPr lang="en-US" dirty="0" err="1"/>
+              <a:t>EntryPoint</a:t>
+            </a:r>
+            <a:r>
+              <a:rPr lang="en-US" dirty="0">
+                <a:effectLst/>
+              </a:rPr>
+              <a:t>&gt;]</a:t>
+            </a:r>
+            <a:br>
+              <a:rPr lang="en-US" dirty="0"/>
+            </a:br>
+            <a:r>
+              <a:rPr lang="en-US" sz="900" b="1" kern="1200" dirty="0">
+                <a:solidFill>
+                  <a:schemeClr val="tx1"/>
+                </a:solidFill>
+                <a:effectLst/>
+                <a:latin typeface="+mn-lt"/>
+                <a:ea typeface="+mn-ea"/>
+                <a:cs typeface="+mn-cs"/>
+              </a:rPr>
+              <a:t>let</a:t>
+            </a:r>
+            <a:r>
+              <a:rPr lang="en-US" dirty="0"/>
+              <a:t> main </a:t>
+            </a:r>
+            <a:r>
+              <a:rPr lang="en-US" dirty="0" err="1"/>
+              <a:t>argv</a:t>
+            </a:r>
+            <a:r>
+              <a:rPr lang="en-US" dirty="0"/>
+              <a:t> =</a:t>
+            </a:r>
+            <a:br>
+              <a:rPr lang="en-US" dirty="0"/>
+            </a:br>
+            <a:r>
+              <a:rPr lang="en-US" dirty="0"/>
+              <a:t>    </a:t>
+            </a:r>
+            <a:r>
+              <a:rPr lang="en-US" dirty="0" err="1"/>
+              <a:t>Array.head</a:t>
+            </a:r>
+            <a:r>
+              <a:rPr lang="en-US" dirty="0"/>
+              <a:t> </a:t>
+            </a:r>
+            <a:r>
+              <a:rPr lang="en-US" dirty="0" err="1"/>
+              <a:t>argv</a:t>
+            </a:r>
+            <a:br>
+              <a:rPr lang="en-US" dirty="0"/>
+            </a:br>
+            <a:r>
+              <a:rPr lang="en-US" dirty="0"/>
+              <a:t>    |&gt; </a:t>
+            </a:r>
+            <a:r>
+              <a:rPr lang="en-US" dirty="0" err="1"/>
+              <a:t>printfn</a:t>
+            </a:r>
+            <a:r>
+              <a:rPr lang="en-US" dirty="0"/>
+              <a:t> </a:t>
+            </a:r>
+            <a:r>
+              <a:rPr lang="en-US" sz="900" b="1" kern="1200" dirty="0">
+                <a:solidFill>
+                  <a:schemeClr val="tx1"/>
+                </a:solidFill>
+                <a:effectLst/>
+                <a:latin typeface="+mn-lt"/>
+                <a:ea typeface="+mn-ea"/>
+                <a:cs typeface="+mn-cs"/>
+              </a:rPr>
+              <a:t>"Hello %s from F#!"</a:t>
+            </a:r>
+            <a:br>
+              <a:rPr lang="en-US" dirty="0"/>
+            </a:br>
+            <a:r>
+              <a:rPr lang="en-US" dirty="0"/>
+              <a:t>    0 </a:t>
+            </a:r>
+            <a:r>
+              <a:rPr lang="en-US" sz="900" i="1" kern="1200" dirty="0">
+                <a:solidFill>
+                  <a:schemeClr val="tx1"/>
+                </a:solidFill>
+                <a:effectLst/>
+                <a:latin typeface="+mn-lt"/>
+                <a:ea typeface="+mn-ea"/>
+                <a:cs typeface="+mn-cs"/>
+              </a:rPr>
+              <a:t>// return an integer exit code</a:t>
+            </a:r>
+          </a:p>
+          <a:p>
+            <a:endParaRPr lang="en-US" sz="900" i="1" kern="1200" dirty="0">
+              <a:solidFill>
+                <a:schemeClr val="tx1"/>
+              </a:solidFill>
+              <a:effectLst/>
+              <a:latin typeface="+mn-lt"/>
+              <a:ea typeface="+mn-ea"/>
+              <a:cs typeface="+mn-cs"/>
+            </a:endParaRPr>
+          </a:p>
+          <a:p>
+            <a:r>
+              <a:rPr lang="en-US" dirty="0" err="1"/>
+              <a:t>Dotnet</a:t>
+            </a:r>
+            <a:r>
+              <a:rPr lang="en-US" dirty="0"/>
+              <a:t> run “World”, then publish and check again in </a:t>
+            </a:r>
+            <a:r>
+              <a:rPr lang="en-US" dirty="0" err="1"/>
+              <a:t>dotpeek</a:t>
+            </a:r>
+            <a:r>
+              <a:rPr lang="en-US" dirty="0"/>
+              <a:t>. The </a:t>
+            </a:r>
+            <a:r>
+              <a:rPr lang="en-US" dirty="0" err="1"/>
+              <a:t>fsharp</a:t>
+            </a:r>
+            <a:r>
+              <a:rPr lang="en-US" dirty="0"/>
+              <a:t> code get’s compiled to IL that used </a:t>
+            </a:r>
+            <a:r>
+              <a:rPr lang="en-US" dirty="0" err="1"/>
+              <a:t>FSharpCore</a:t>
+            </a:r>
+            <a:r>
+              <a:rPr lang="en-US" dirty="0"/>
+              <a:t>.</a:t>
+            </a:r>
           </a:p>
         </p:txBody>
       </p:sp>
@@ -669,7 +960,7 @@
           <a:p>
             <a:fld id="{A4DA1251-EEE1-7E43-9DEC-BEE3AEE2021B}" type="slidenum">
               <a:rPr lang="en-US" smtClean="0"/>
-              <a:t>3</a:t>
+              <a:t>4</a:t>
             </a:fld>
             <a:endParaRPr lang="en-US"/>
           </a:p>
@@ -678,7 +969,7 @@
     </p:spTree>
     <p:extLst>
       <p:ext uri="{BB962C8B-B14F-4D97-AF65-F5344CB8AC3E}">
-        <p14:creationId xmlns:p14="http://schemas.microsoft.com/office/powerpoint/2010/main" val="2635353258"/>
+        <p14:creationId xmlns:p14="http://schemas.microsoft.com/office/powerpoint/2010/main" val="102149909"/>
       </p:ext>
     </p:extLst>
   </p:cSld>
@@ -733,149 +1024,7 @@
           <a:lstStyle/>
           <a:p>
             <a:r>
-              <a:rPr lang="en-US" dirty="0"/>
-              <a:t>Demo:</a:t>
-            </a:r>
-          </a:p>
-          <a:p>
-            <a:endParaRPr lang="en-US" dirty="0"/>
-          </a:p>
-          <a:p>
-            <a:r>
-              <a:rPr lang="en-US" dirty="0"/>
-              <a:t>Create a new console application:</a:t>
-            </a:r>
-          </a:p>
-          <a:p>
-            <a:endParaRPr lang="en-US" dirty="0"/>
-          </a:p>
-          <a:p>
-            <a:r>
-              <a:rPr lang="en-US" dirty="0"/>
-              <a:t>PS C:\temp&gt; </a:t>
-            </a:r>
-            <a:r>
-              <a:rPr lang="en-US" dirty="0" err="1"/>
-              <a:t>dotnet</a:t>
-            </a:r>
-            <a:r>
-              <a:rPr lang="en-US" dirty="0"/>
-              <a:t> new console -</a:t>
-            </a:r>
-            <a:r>
-              <a:rPr lang="en-US" dirty="0" err="1"/>
-              <a:t>lang</a:t>
-            </a:r>
-            <a:r>
-              <a:rPr lang="en-US" dirty="0"/>
-              <a:t> F# -n HelloWorld</a:t>
-            </a:r>
-          </a:p>
-          <a:p>
-            <a:endParaRPr lang="en-US" dirty="0"/>
-          </a:p>
-          <a:p>
-            <a:r>
-              <a:rPr lang="en-US" dirty="0"/>
-              <a:t>Open in rider, explain </a:t>
-            </a:r>
-            <a:r>
-              <a:rPr lang="en-US" dirty="0" err="1"/>
-              <a:t>Program.fs</a:t>
-            </a:r>
-            <a:endParaRPr lang="en-US" dirty="0"/>
-          </a:p>
-          <a:p>
-            <a:endParaRPr lang="en-US" dirty="0"/>
-          </a:p>
-          <a:p>
-            <a:r>
-              <a:rPr lang="en-US" dirty="0"/>
-              <a:t>Do a </a:t>
-            </a:r>
-            <a:r>
-              <a:rPr lang="en-US" dirty="0" err="1"/>
-              <a:t>dotnet</a:t>
-            </a:r>
-            <a:r>
-              <a:rPr lang="en-US" dirty="0"/>
-              <a:t> publish and open </a:t>
-            </a:r>
-            <a:r>
-              <a:rPr lang="en-US" dirty="0" err="1"/>
-              <a:t>dll</a:t>
-            </a:r>
-            <a:r>
-              <a:rPr lang="en-US" dirty="0"/>
-              <a:t> in </a:t>
-            </a:r>
-            <a:r>
-              <a:rPr lang="en-US" dirty="0" err="1"/>
-              <a:t>dotpeek</a:t>
-            </a:r>
-            <a:r>
-              <a:rPr lang="en-US" dirty="0"/>
-              <a:t>. Clue is that the compiled F# needs the </a:t>
-            </a:r>
-            <a:r>
-              <a:rPr lang="en-US" dirty="0" err="1"/>
-              <a:t>Fsharp</a:t>
-            </a:r>
-            <a:r>
-              <a:rPr lang="en-US" dirty="0"/>
-              <a:t> core </a:t>
-            </a:r>
-            <a:r>
-              <a:rPr lang="en-US" dirty="0" err="1"/>
-              <a:t>dll</a:t>
-            </a:r>
-            <a:r>
-              <a:rPr lang="en-US" dirty="0"/>
-              <a:t> to run.</a:t>
-            </a:r>
-          </a:p>
-          <a:p>
-            <a:endParaRPr lang="en-US" dirty="0"/>
-          </a:p>
-          <a:p>
-            <a:r>
-              <a:rPr lang="en-US" dirty="0"/>
-              <a:t>Change </a:t>
-            </a:r>
-            <a:r>
-              <a:rPr lang="en-US" dirty="0" err="1"/>
-              <a:t>Program.fs</a:t>
-            </a:r>
-            <a:r>
-              <a:rPr lang="en-US" dirty="0"/>
-              <a:t> to</a:t>
-            </a:r>
-          </a:p>
-          <a:p>
-            <a:endParaRPr lang="en-US" dirty="0"/>
-          </a:p>
-          <a:p>
-            <a:r>
-              <a:rPr lang="en-US" dirty="0">
-                <a:effectLst/>
-              </a:rPr>
-              <a:t>[&lt;</a:t>
-            </a:r>
-            <a:r>
-              <a:rPr lang="en-US" dirty="0" err="1"/>
-              <a:t>EntryPoint</a:t>
-            </a:r>
-            <a:r>
-              <a:rPr lang="en-US" dirty="0">
-                <a:effectLst/>
-              </a:rPr>
-              <a:t>&gt;]</a:t>
-            </a:r>
-            <a:br>
-              <a:rPr lang="en-US" dirty="0"/>
-            </a:br>
-            <a:r>
-              <a:rPr lang="en-US" sz="900" b="1" kern="1200" dirty="0">
+              <a:rPr lang="en-US" sz="900" b="0" i="0" kern="1200" dirty="0">
                 <a:solidFill>
                   <a:schemeClr val="tx1"/>
                 </a:solidFill>
@@ -884,56 +1033,10 @@
                 <a:ea typeface="+mn-ea"/>
                 <a:cs typeface="+mn-cs"/>
               </a:rPr>
-              <a:t>let</a:t>
-            </a:r>
-            <a:r>
-              <a:rPr lang="en-US" dirty="0"/>
-              <a:t> main </a:t>
-            </a:r>
-            <a:r>
-              <a:rPr lang="en-US" dirty="0" err="1"/>
-              <a:t>argv</a:t>
-            </a:r>
-            <a:r>
-              <a:rPr lang="en-US" dirty="0"/>
-              <a:t> =</a:t>
-            </a:r>
-            <a:br>
-              <a:rPr lang="en-US" dirty="0"/>
-            </a:br>
-            <a:r>
-              <a:rPr lang="en-US" dirty="0"/>
-              <a:t>    </a:t>
-            </a:r>
-            <a:r>
-              <a:rPr lang="en-US" dirty="0" err="1"/>
-              <a:t>Array.head</a:t>
-            </a:r>
-            <a:r>
-              <a:rPr lang="en-US" dirty="0"/>
-              <a:t> </a:t>
-            </a:r>
-            <a:r>
-              <a:rPr lang="en-US" dirty="0" err="1"/>
-              <a:t>argv</a:t>
-            </a:r>
-            <a:br>
-              <a:rPr lang="en-US" dirty="0"/>
-            </a:br>
-            <a:r>
-              <a:rPr lang="en-US" dirty="0"/>
-              <a:t>    |&gt; </a:t>
-            </a:r>
-            <a:r>
-              <a:rPr lang="en-US" dirty="0" err="1"/>
-              <a:t>printfn</a:t>
-            </a:r>
-            <a:r>
-              <a:rPr lang="en-US" dirty="0"/>
-              <a:t> </a:t>
-            </a:r>
-            <a:r>
-              <a:rPr lang="en-US" sz="900" b="1" kern="1200" dirty="0">
+              <a:t>The visional design of the .NET platform was very much expected to be a </a:t>
+            </a:r>
+            <a:r>
+              <a:rPr lang="en-US" sz="900" b="0" i="0" kern="1200" dirty="0" err="1">
                 <a:solidFill>
                   <a:schemeClr val="tx1"/>
                 </a:solidFill>
@@ -942,17 +1045,10 @@
                 <a:ea typeface="+mn-ea"/>
                 <a:cs typeface="+mn-cs"/>
               </a:rPr>
-              <a:t>"Hello %s from F#!"</a:t>
-            </a:r>
-            <a:br>
-              <a:rPr lang="en-US" dirty="0"/>
-            </a:br>
-            <a:r>
-              <a:rPr lang="en-US" dirty="0"/>
-              <a:t>    0 </a:t>
-            </a:r>
-            <a:r>
-              <a:rPr lang="en-US" sz="900" i="1" kern="1200" dirty="0">
+              <a:t>multilanguage</a:t>
+            </a:r>
+            <a:r>
+              <a:rPr lang="en-US" sz="900" b="0" i="0" kern="1200" dirty="0">
                 <a:solidFill>
                   <a:schemeClr val="tx1"/>
                 </a:solidFill>
@@ -961,53 +1057,62 @@
                 <a:ea typeface="+mn-ea"/>
                 <a:cs typeface="+mn-cs"/>
               </a:rPr>
-              <a:t>// return an integer exit code</a:t>
-            </a:r>
-          </a:p>
-          <a:p>
-            <a:endParaRPr lang="en-US" sz="900" i="1" kern="1200" dirty="0">
-              <a:solidFill>
-                <a:schemeClr val="tx1"/>
-              </a:solidFill>
-              <a:effectLst/>
-              <a:latin typeface="+mn-lt"/>
-              <a:ea typeface="+mn-ea"/>
-              <a:cs typeface="+mn-cs"/>
-            </a:endParaRPr>
-          </a:p>
-          <a:p>
+              <a:t> platform from the start.</a:t>
+            </a:r>
+          </a:p>
+          <a:p>
+            <a:endParaRPr lang="en-US" dirty="0"/>
+          </a:p>
+          <a:p>
+            <a:r>
+              <a:rPr lang="en-US" dirty="0"/>
+              <a:t>The Haskell for </a:t>
+            </a:r>
             <a:r>
               <a:rPr lang="en-US" dirty="0" err="1"/>
-              <a:t>Dotnet</a:t>
-            </a:r>
-            <a:r>
-              <a:rPr lang="en-US" dirty="0"/>
-              <a:t> run “World”, then publish and check again in </a:t>
-            </a:r>
-            <a:r>
-              <a:rPr lang="en-US" dirty="0" err="1"/>
-              <a:t>dotpeek</a:t>
-            </a:r>
-            <a:r>
-              <a:rPr lang="en-US" dirty="0"/>
-              <a:t>. The </a:t>
-            </a:r>
-            <a:r>
-              <a:rPr lang="en-US" dirty="0" err="1"/>
-              <a:t>fsharp</a:t>
-            </a:r>
-            <a:r>
-              <a:rPr lang="en-US" dirty="0"/>
-              <a:t> code get’s compiled to IL that used </a:t>
-            </a:r>
-            <a:r>
-              <a:rPr lang="en-US" dirty="0" err="1"/>
-              <a:t>FSharpCore</a:t>
-            </a:r>
-            <a:r>
-              <a:rPr lang="en-US" dirty="0"/>
+              <a:t>dotnet</a:t>
+            </a:r>
+            <a:r>
+              <a:rPr lang="en-US" dirty="0"/>
+              <a:t> ended up with too much </a:t>
+            </a:r>
+            <a:r>
+              <a:rPr lang="en-US" sz="900" b="0" i="0" kern="1200" dirty="0">
+                <a:solidFill>
+                  <a:schemeClr val="tx1"/>
+                </a:solidFill>
+                <a:effectLst/>
+                <a:latin typeface="+mn-lt"/>
+                <a:ea typeface="+mn-ea"/>
+                <a:cs typeface="+mn-cs"/>
+              </a:rPr>
+              <a:t>dissonance between Haskell and </a:t>
+            </a:r>
+            <a:r>
+              <a:rPr lang="en-US" sz="900" b="0" i="0" kern="1200" dirty="0" err="1">
+                <a:solidFill>
+                  <a:schemeClr val="tx1"/>
+                </a:solidFill>
+                <a:effectLst/>
+                <a:latin typeface="+mn-lt"/>
+                <a:ea typeface="+mn-ea"/>
+                <a:cs typeface="+mn-cs"/>
+              </a:rPr>
+              <a:t>dotnet</a:t>
+            </a:r>
+            <a:r>
+              <a:rPr lang="en-US" sz="900" b="0" i="0" kern="1200" dirty="0">
+                <a:solidFill>
+                  <a:schemeClr val="tx1"/>
+                </a:solidFill>
+                <a:effectLst/>
+                <a:latin typeface="+mn-lt"/>
+                <a:ea typeface="+mn-ea"/>
+                <a:cs typeface="+mn-cs"/>
+              </a:rPr>
               <a:t>.</a:t>
             </a:r>
+            <a:endParaRPr lang="LID4096" dirty="0"/>
           </a:p>
         </p:txBody>
       </p:sp>
@@ -1028,7 +1133,7 @@
           <a:p>
             <a:fld id="{A4DA1251-EEE1-7E43-9DEC-BEE3AEE2021B}" type="slidenum">
               <a:rPr lang="en-US" smtClean="0"/>
-              <a:t>4</a:t>
+              <a:t>5</a:t>
             </a:fld>
             <a:endParaRPr lang="en-US"/>
           </a:p>
@@ -1037,7 +1142,7 @@
     </p:spTree>
     <p:extLst>
       <p:ext uri="{BB962C8B-B14F-4D97-AF65-F5344CB8AC3E}">
-        <p14:creationId xmlns:p14="http://schemas.microsoft.com/office/powerpoint/2010/main" val="102149909"/>
+        <p14:creationId xmlns:p14="http://schemas.microsoft.com/office/powerpoint/2010/main" val="3705349940"/>
       </p:ext>
     </p:extLst>
   </p:cSld>
@@ -1091,95 +1196,6 @@
           <a:bodyPr/>
           <a:lstStyle/>
           <a:p>
-            <a:r>
-              <a:rPr lang="en-US" sz="900" b="0" i="0" kern="1200" dirty="0">
-                <a:solidFill>
-                  <a:schemeClr val="tx1"/>
-                </a:solidFill>
-                <a:effectLst/>
-                <a:latin typeface="+mn-lt"/>
-                <a:ea typeface="+mn-ea"/>
-                <a:cs typeface="+mn-cs"/>
-              </a:rPr>
-              <a:t>The visional design of the .NET platform was very much expected to be a </a:t>
-            </a:r>
-            <a:r>
-              <a:rPr lang="en-US" sz="900" b="0" i="0" kern="1200" dirty="0" err="1">
-                <a:solidFill>
-                  <a:schemeClr val="tx1"/>
-                </a:solidFill>
-                <a:effectLst/>
-                <a:latin typeface="+mn-lt"/>
-                <a:ea typeface="+mn-ea"/>
-                <a:cs typeface="+mn-cs"/>
-              </a:rPr>
-              <a:t>multilanguage</a:t>
-            </a:r>
-            <a:r>
-              <a:rPr lang="en-US" sz="900" b="0" i="0" kern="1200" dirty="0">
-                <a:solidFill>
-                  <a:schemeClr val="tx1"/>
-                </a:solidFill>
-                <a:effectLst/>
-                <a:latin typeface="+mn-lt"/>
-                <a:ea typeface="+mn-ea"/>
-                <a:cs typeface="+mn-cs"/>
-              </a:rPr>
-              <a:t> platform from the start.</a:t>
-            </a:r>
-          </a:p>
-          <a:p>
-            <a:endParaRPr lang="en-US" dirty="0"/>
-          </a:p>
-          <a:p>
-            <a:r>
-              <a:rPr lang="en-US" dirty="0"/>
-              <a:t>The Haskell for </a:t>
-            </a:r>
-            <a:r>
-              <a:rPr lang="en-US" dirty="0" err="1"/>
-              <a:t>dotnet</a:t>
-            </a:r>
-            <a:r>
-              <a:rPr lang="en-US" dirty="0"/>
-              <a:t> ended up with too much </a:t>
-            </a:r>
-            <a:r>
-              <a:rPr lang="en-US" sz="900" b="0" i="0" kern="1200" dirty="0">
-                <a:solidFill>
-                  <a:schemeClr val="tx1"/>
-                </a:solidFill>
-                <a:effectLst/>
-                <a:latin typeface="+mn-lt"/>
-                <a:ea typeface="+mn-ea"/>
-                <a:cs typeface="+mn-cs"/>
-              </a:rPr>
-              <a:t>dissonance between Haskell and </a:t>
-            </a:r>
-            <a:r>
-              <a:rPr lang="en-US" sz="900" b="0" i="0" kern="1200" dirty="0" err="1">
-                <a:solidFill>
-                  <a:schemeClr val="tx1"/>
-                </a:solidFill>
-                <a:effectLst/>
-                <a:latin typeface="+mn-lt"/>
-                <a:ea typeface="+mn-ea"/>
-                <a:cs typeface="+mn-cs"/>
-              </a:rPr>
-              <a:t>dotnet</a:t>
-            </a:r>
-            <a:r>
-              <a:rPr lang="en-US" sz="900" b="0" i="0" kern="1200" dirty="0">
-                <a:solidFill>
-                  <a:schemeClr val="tx1"/>
-                </a:solidFill>
-                <a:effectLst/>
-                <a:latin typeface="+mn-lt"/>
-                <a:ea typeface="+mn-ea"/>
-                <a:cs typeface="+mn-cs"/>
-              </a:rPr>
-              <a:t>.</a:t>
-            </a:r>
             <a:endParaRPr lang="LID4096" dirty="0"/>
           </a:p>
         </p:txBody>
@@ -1201,7 +1217,7 @@
           <a:p>
             <a:fld id="{A4DA1251-EEE1-7E43-9DEC-BEE3AEE2021B}" type="slidenum">
               <a:rPr lang="en-US" smtClean="0"/>
-              <a:t>5</a:t>
+              <a:t>6</a:t>
             </a:fld>
             <a:endParaRPr lang="en-US"/>
           </a:p>
@@ -1210,7 +1226,7 @@
     </p:spTree>
     <p:extLst>
       <p:ext uri="{BB962C8B-B14F-4D97-AF65-F5344CB8AC3E}">
-        <p14:creationId xmlns:p14="http://schemas.microsoft.com/office/powerpoint/2010/main" val="3705349940"/>
+        <p14:creationId xmlns:p14="http://schemas.microsoft.com/office/powerpoint/2010/main" val="3280064324"/>
       </p:ext>
     </p:extLst>
   </p:cSld>
@@ -1285,7 +1301,7 @@
           <a:p>
             <a:fld id="{A4DA1251-EEE1-7E43-9DEC-BEE3AEE2021B}" type="slidenum">
               <a:rPr lang="en-US" smtClean="0"/>
-              <a:t>6</a:t>
+              <a:t>7</a:t>
             </a:fld>
             <a:endParaRPr lang="en-US"/>
           </a:p>
@@ -1294,7 +1310,7 @@
     </p:spTree>
     <p:extLst>
       <p:ext uri="{BB962C8B-B14F-4D97-AF65-F5344CB8AC3E}">
-        <p14:creationId xmlns:p14="http://schemas.microsoft.com/office/powerpoint/2010/main" val="3280064324"/>
+        <p14:creationId xmlns:p14="http://schemas.microsoft.com/office/powerpoint/2010/main" val="2313189574"/>
       </p:ext>
     </p:extLst>
   </p:cSld>
@@ -1369,7 +1385,7 @@
           <a:p>
             <a:fld id="{A4DA1251-EEE1-7E43-9DEC-BEE3AEE2021B}" type="slidenum">
               <a:rPr lang="en-US" smtClean="0"/>
-              <a:t>7</a:t>
+              <a:t>8</a:t>
             </a:fld>
             <a:endParaRPr lang="en-US"/>
           </a:p>
@@ -1378,7 +1394,7 @@
     </p:spTree>
     <p:extLst>
       <p:ext uri="{BB962C8B-B14F-4D97-AF65-F5344CB8AC3E}">
-        <p14:creationId xmlns:p14="http://schemas.microsoft.com/office/powerpoint/2010/main" val="2313189574"/>
+        <p14:creationId xmlns:p14="http://schemas.microsoft.com/office/powerpoint/2010/main" val="2291314286"/>
       </p:ext>
     </p:extLst>
   </p:cSld>
@@ -1432,7 +1448,34 @@
           <a:bodyPr/>
           <a:lstStyle/>
           <a:p>
-            <a:endParaRPr lang="LID4096" dirty="0"/>
+            <a:r>
+              <a:rPr lang="en-US" dirty="0"/>
+              <a:t>Eco system, </a:t>
+            </a:r>
+            <a:r>
+              <a:rPr lang="en-US" dirty="0" err="1"/>
+              <a:t>nuget</a:t>
+            </a:r>
+            <a:r>
+              <a:rPr lang="en-US" dirty="0"/>
+              <a:t>/editors/ docs by MS</a:t>
+            </a:r>
+          </a:p>
+          <a:p>
+            <a:r>
+              <a:rPr lang="en-US" dirty="0" err="1"/>
+              <a:t>Interopt</a:t>
+            </a:r>
+            <a:r>
+              <a:rPr lang="en-US" dirty="0"/>
+              <a:t> -&gt; at the end of the day it’s all IL</a:t>
+            </a:r>
+          </a:p>
+          <a:p>
+            <a:r>
+              <a:rPr lang="en-US" dirty="0"/>
+              <a:t>Not a pure functional language, mutability is possible</a:t>
+            </a:r>
           </a:p>
         </p:txBody>
       </p:sp>
@@ -1453,7 +1496,7 @@
           <a:p>
             <a:fld id="{A4DA1251-EEE1-7E43-9DEC-BEE3AEE2021B}" type="slidenum">
               <a:rPr lang="en-US" smtClean="0"/>
-              <a:t>8</a:t>
+              <a:t>9</a:t>
             </a:fld>
             <a:endParaRPr lang="en-US"/>
           </a:p>
@@ -1462,7 +1505,7 @@
     </p:spTree>
     <p:extLst>
       <p:ext uri="{BB962C8B-B14F-4D97-AF65-F5344CB8AC3E}">
-        <p14:creationId xmlns:p14="http://schemas.microsoft.com/office/powerpoint/2010/main" val="2291314286"/>
+        <p14:creationId xmlns:p14="http://schemas.microsoft.com/office/powerpoint/2010/main" val="4228326286"/>
       </p:ext>
     </p:extLst>
   </p:cSld>
@@ -1516,34 +1559,7 @@
           <a:bodyPr/>
           <a:lstStyle/>
           <a:p>
-            <a:r>
-              <a:rPr lang="en-US" dirty="0"/>
-              <a:t>Eco system, </a:t>
-            </a:r>
-            <a:r>
-              <a:rPr lang="en-US" dirty="0" err="1"/>
-              <a:t>nuget</a:t>
-            </a:r>
-            <a:r>
-              <a:rPr lang="en-US" dirty="0"/>
-              <a:t>/editors/ docs by MS</a:t>
-            </a:r>
-          </a:p>
-          <a:p>
-            <a:r>
-              <a:rPr lang="en-US" dirty="0" err="1"/>
-              <a:t>Interopt</a:t>
-            </a:r>
-            <a:r>
-              <a:rPr lang="en-US" dirty="0"/>
-              <a:t> -&gt; at the end of the day it’s all IL</a:t>
-            </a:r>
-          </a:p>
-          <a:p>
-            <a:r>
-              <a:rPr lang="en-US" dirty="0"/>
-              <a:t>Not a pure functional language, mutability is possible</a:t>
-            </a:r>
+            <a:endParaRPr lang="LID4096" dirty="0"/>
           </a:p>
         </p:txBody>
       </p:sp>
@@ -1564,7 +1580,7 @@
           <a:p>
             <a:fld id="{A4DA1251-EEE1-7E43-9DEC-BEE3AEE2021B}" type="slidenum">
               <a:rPr lang="en-US" smtClean="0"/>
-              <a:t>9</a:t>
+              <a:t>13</a:t>
             </a:fld>
             <a:endParaRPr lang="en-US"/>
           </a:p>
@@ -1573,7 +1589,7 @@
     </p:spTree>
     <p:extLst>
       <p:ext uri="{BB962C8B-B14F-4D97-AF65-F5344CB8AC3E}">
-        <p14:creationId xmlns:p14="http://schemas.microsoft.com/office/powerpoint/2010/main" val="4228326286"/>
+        <p14:creationId xmlns:p14="http://schemas.microsoft.com/office/powerpoint/2010/main" val="2149197559"/>
       </p:ext>
     </p:extLst>
   </p:cSld>
@@ -1648,7 +1664,7 @@
           <a:p>
             <a:fld id="{A4DA1251-EEE1-7E43-9DEC-BEE3AEE2021B}" type="slidenum">
               <a:rPr lang="en-US" smtClean="0"/>
-              <a:t>11</a:t>
+              <a:t>19</a:t>
             </a:fld>
             <a:endParaRPr lang="en-US"/>
           </a:p>
@@ -6568,7 +6584,7 @@
           <p:cNvPr id="2" name="Title 1">
             <a:extLst>
               <a:ext uri="{FF2B5EF4-FFF2-40B4-BE49-F238E27FC236}">
-                <a16:creationId xmlns:a16="http://schemas.microsoft.com/office/drawing/2014/main" id="{A49AC9B1-52C2-4339-91A5-CFB58942EDCB}"/>
+                <a16:creationId xmlns:a16="http://schemas.microsoft.com/office/drawing/2014/main" id="{D21C5ED5-3FA6-4C97-A00E-00422E6D8CC6}"/>
               </a:ext>
             </a:extLst>
           </p:cNvPr>
@@ -6586,7 +6602,7 @@
           <a:p>
             <a:r>
               <a:rPr lang="en-US" dirty="0"/>
-              <a:t>Giraffe</a:t>
+              <a:t>Language features</a:t>
             </a:r>
             <a:endParaRPr lang="LID4096" dirty="0"/>
           </a:p>
@@ -6594,10 +6610,10 @@
       </p:sp>
       <p:sp>
         <p:nvSpPr>
-          <p:cNvPr id="3" name="Text Placeholder 2">
+          <p:cNvPr id="3" name="Content Placeholder 2">
             <a:extLst>
               <a:ext uri="{FF2B5EF4-FFF2-40B4-BE49-F238E27FC236}">
-                <a16:creationId xmlns:a16="http://schemas.microsoft.com/office/drawing/2014/main" id="{93F7D11D-F8DD-46FA-B9D6-BF127C2C9BB9}"/>
+                <a16:creationId xmlns:a16="http://schemas.microsoft.com/office/drawing/2014/main" id="{12017746-5D05-4F33-9E17-91082628B283}"/>
               </a:ext>
             </a:extLst>
           </p:cNvPr>
@@ -6605,7 +6621,7 @@
             <a:spLocks noGrp="1"/>
           </p:cNvSpPr>
           <p:nvPr>
-            <p:ph type="body" sz="quarter" idx="10"/>
+            <p:ph idx="1"/>
           </p:nvPr>
         </p:nvSpPr>
         <p:spPr/>
@@ -6613,251 +6629,36 @@
           <a:bodyPr/>
           <a:lstStyle/>
           <a:p>
-            <a:endParaRPr lang="LID4096"/>
-          </a:p>
-        </p:txBody>
-      </p:sp>
-      <p:sp>
-        <p:nvSpPr>
-          <p:cNvPr id="4" name="Text Placeholder 3">
-            <a:extLst>
-              <a:ext uri="{FF2B5EF4-FFF2-40B4-BE49-F238E27FC236}">
-                <a16:creationId xmlns:a16="http://schemas.microsoft.com/office/drawing/2014/main" id="{A9CED24F-0CD2-4AF0-87D5-EF29159FE80B}"/>
-              </a:ext>
-            </a:extLst>
-          </p:cNvPr>
-          <p:cNvSpPr>
-            <a:spLocks noGrp="1"/>
-          </p:cNvSpPr>
-          <p:nvPr>
-            <p:ph type="body" sz="quarter" idx="11"/>
-          </p:nvPr>
-        </p:nvSpPr>
-        <p:spPr/>
-        <p:txBody>
-          <a:bodyPr/>
-          <a:lstStyle/>
-          <a:p>
-            <a:r>
-              <a:rPr lang="en-US" dirty="0" err="1"/>
-              <a:t>AspNetCore</a:t>
-            </a:r>
-            <a:endParaRPr lang="LID4096" dirty="0"/>
-          </a:p>
-        </p:txBody>
-      </p:sp>
-      <p:sp>
-        <p:nvSpPr>
-          <p:cNvPr id="5" name="Text Placeholder 4">
-            <a:extLst>
-              <a:ext uri="{FF2B5EF4-FFF2-40B4-BE49-F238E27FC236}">
-                <a16:creationId xmlns:a16="http://schemas.microsoft.com/office/drawing/2014/main" id="{050F6630-2E97-4C70-A955-DD56C7619DC2}"/>
-              </a:ext>
-            </a:extLst>
-          </p:cNvPr>
-          <p:cNvSpPr>
-            <a:spLocks noGrp="1"/>
-          </p:cNvSpPr>
-          <p:nvPr>
-            <p:ph type="body" sz="quarter" idx="12"/>
-          </p:nvPr>
-        </p:nvSpPr>
-        <p:spPr/>
-        <p:txBody>
-          <a:bodyPr/>
-          <a:lstStyle/>
-          <a:p>
-            <a:endParaRPr lang="LID4096"/>
-          </a:p>
-        </p:txBody>
-      </p:sp>
-      <p:sp>
-        <p:nvSpPr>
-          <p:cNvPr id="6" name="Text Placeholder 5">
-            <a:extLst>
-              <a:ext uri="{FF2B5EF4-FFF2-40B4-BE49-F238E27FC236}">
-                <a16:creationId xmlns:a16="http://schemas.microsoft.com/office/drawing/2014/main" id="{54FCB7DD-9227-4CC2-A5EC-B5AED6B7FEE1}"/>
-              </a:ext>
-            </a:extLst>
-          </p:cNvPr>
-          <p:cNvSpPr>
-            <a:spLocks noGrp="1"/>
-          </p:cNvSpPr>
-          <p:nvPr>
-            <p:ph type="body" sz="quarter" idx="13"/>
-          </p:nvPr>
-        </p:nvSpPr>
-        <p:spPr/>
-        <p:txBody>
-          <a:bodyPr/>
-          <a:lstStyle/>
-          <a:p>
-            <a:r>
-              <a:rPr lang="en-US" dirty="0"/>
-              <a:t>Suave</a:t>
-            </a:r>
-            <a:endParaRPr lang="LID4096" dirty="0"/>
-          </a:p>
-        </p:txBody>
-      </p:sp>
-      <p:sp>
-        <p:nvSpPr>
-          <p:cNvPr id="7" name="Text Placeholder 6">
-            <a:extLst>
-              <a:ext uri="{FF2B5EF4-FFF2-40B4-BE49-F238E27FC236}">
-                <a16:creationId xmlns:a16="http://schemas.microsoft.com/office/drawing/2014/main" id="{A750C8D1-DAAB-42F5-BAE1-880AE4FB6C51}"/>
-              </a:ext>
-            </a:extLst>
-          </p:cNvPr>
-          <p:cNvSpPr>
-            <a:spLocks noGrp="1"/>
-          </p:cNvSpPr>
-          <p:nvPr>
-            <p:ph type="body" sz="quarter" idx="14"/>
-          </p:nvPr>
-        </p:nvSpPr>
-        <p:spPr/>
-        <p:txBody>
-          <a:bodyPr/>
-          <a:lstStyle/>
-          <a:p>
-            <a:endParaRPr lang="LID4096"/>
-          </a:p>
-        </p:txBody>
-      </p:sp>
-      <p:sp>
-        <p:nvSpPr>
-          <p:cNvPr id="8" name="Text Placeholder 7">
-            <a:extLst>
-              <a:ext uri="{FF2B5EF4-FFF2-40B4-BE49-F238E27FC236}">
-                <a16:creationId xmlns:a16="http://schemas.microsoft.com/office/drawing/2014/main" id="{0B350FA3-F71F-4DA3-BF3C-727608F86362}"/>
-              </a:ext>
-            </a:extLst>
-          </p:cNvPr>
-          <p:cNvSpPr>
-            <a:spLocks noGrp="1"/>
-          </p:cNvSpPr>
-          <p:nvPr>
-            <p:ph type="body" sz="quarter" idx="15"/>
-          </p:nvPr>
-        </p:nvSpPr>
-        <p:spPr/>
-        <p:txBody>
-          <a:bodyPr/>
-          <a:lstStyle/>
-          <a:p>
-            <a:r>
-              <a:rPr lang="en-US" dirty="0"/>
-              <a:t>Base constructs</a:t>
-            </a:r>
-            <a:endParaRPr lang="LID4096" dirty="0"/>
-          </a:p>
-        </p:txBody>
-      </p:sp>
-      <p:sp>
-        <p:nvSpPr>
-          <p:cNvPr id="9" name="Text Placeholder 8">
-            <a:extLst>
-              <a:ext uri="{FF2B5EF4-FFF2-40B4-BE49-F238E27FC236}">
-                <a16:creationId xmlns:a16="http://schemas.microsoft.com/office/drawing/2014/main" id="{4DA4446A-5F74-4190-AEDB-4296399CB319}"/>
-              </a:ext>
-            </a:extLst>
-          </p:cNvPr>
-          <p:cNvSpPr>
-            <a:spLocks noGrp="1"/>
-          </p:cNvSpPr>
-          <p:nvPr>
-            <p:ph type="body" sz="quarter" idx="16"/>
-          </p:nvPr>
-        </p:nvSpPr>
-        <p:spPr/>
-        <p:txBody>
-          <a:bodyPr/>
-          <a:lstStyle/>
-          <a:p>
-            <a:endParaRPr lang="LID4096"/>
-          </a:p>
-        </p:txBody>
-      </p:sp>
-      <p:sp>
-        <p:nvSpPr>
-          <p:cNvPr id="10" name="Text Placeholder 9">
-            <a:extLst>
-              <a:ext uri="{FF2B5EF4-FFF2-40B4-BE49-F238E27FC236}">
-                <a16:creationId xmlns:a16="http://schemas.microsoft.com/office/drawing/2014/main" id="{97F0D131-FA16-4324-8B52-75179D83A297}"/>
-              </a:ext>
-            </a:extLst>
-          </p:cNvPr>
-          <p:cNvSpPr>
-            <a:spLocks noGrp="1"/>
-          </p:cNvSpPr>
-          <p:nvPr>
-            <p:ph type="body" sz="quarter" idx="17"/>
-          </p:nvPr>
-        </p:nvSpPr>
-        <p:spPr/>
-        <p:txBody>
-          <a:bodyPr/>
-          <a:lstStyle/>
-          <a:p>
-            <a:r>
-              <a:rPr lang="en-US" dirty="0"/>
-              <a:t>Http handlers</a:t>
-            </a:r>
-            <a:endParaRPr lang="LID4096" dirty="0"/>
-          </a:p>
-        </p:txBody>
-      </p:sp>
-      <p:sp>
-        <p:nvSpPr>
-          <p:cNvPr id="11" name="Text Placeholder 10">
-            <a:extLst>
-              <a:ext uri="{FF2B5EF4-FFF2-40B4-BE49-F238E27FC236}">
-                <a16:creationId xmlns:a16="http://schemas.microsoft.com/office/drawing/2014/main" id="{D6D6CFA7-AE1C-49AE-8D2F-68A6D1D9A529}"/>
-              </a:ext>
-            </a:extLst>
-          </p:cNvPr>
-          <p:cNvSpPr>
-            <a:spLocks noGrp="1"/>
-          </p:cNvSpPr>
-          <p:nvPr>
-            <p:ph type="body" sz="quarter" idx="18"/>
-          </p:nvPr>
-        </p:nvSpPr>
-        <p:spPr/>
-        <p:txBody>
-          <a:bodyPr/>
-          <a:lstStyle/>
-          <a:p>
-            <a:endParaRPr lang="LID4096"/>
-          </a:p>
-        </p:txBody>
-      </p:sp>
-      <p:sp>
-        <p:nvSpPr>
-          <p:cNvPr id="12" name="Text Placeholder 11">
-            <a:extLst>
-              <a:ext uri="{FF2B5EF4-FFF2-40B4-BE49-F238E27FC236}">
-                <a16:creationId xmlns:a16="http://schemas.microsoft.com/office/drawing/2014/main" id="{4E00A03E-F0A1-4745-AA4D-53376B0664FB}"/>
-              </a:ext>
-            </a:extLst>
-          </p:cNvPr>
-          <p:cNvSpPr>
-            <a:spLocks noGrp="1"/>
-          </p:cNvSpPr>
-          <p:nvPr>
-            <p:ph type="body" sz="quarter" idx="19"/>
-          </p:nvPr>
-        </p:nvSpPr>
-        <p:spPr/>
-        <p:txBody>
-          <a:bodyPr/>
-          <a:lstStyle/>
-          <a:p>
-            <a:r>
-              <a:rPr lang="en-US" dirty="0"/>
-              <a:t>Sample application</a:t>
-            </a:r>
+            <a:r>
+              <a:rPr lang="en-US" dirty="0"/>
+              <a:t>Tuples</a:t>
+            </a:r>
+          </a:p>
+          <a:p>
+            <a:r>
+              <a:rPr lang="en-US" dirty="0"/>
+              <a:t>Records</a:t>
+            </a:r>
+          </a:p>
+          <a:p>
+            <a:r>
+              <a:rPr lang="en-US" dirty="0"/>
+              <a:t>Discriminated Unions</a:t>
+            </a:r>
+          </a:p>
+          <a:p>
+            <a:r>
+              <a:rPr lang="en-US" dirty="0"/>
+              <a:t>Pattern Matching</a:t>
+            </a:r>
+          </a:p>
+          <a:p>
+            <a:r>
+              <a:rPr lang="en-US" dirty="0"/>
+              <a:t>Active Patterns</a:t>
+            </a:r>
+          </a:p>
+          <a:p>
             <a:endParaRPr lang="LID4096" dirty="0"/>
           </a:p>
         </p:txBody>
@@ -6865,7 +6666,7 @@
     </p:spTree>
     <p:extLst>
       <p:ext uri="{BB962C8B-B14F-4D97-AF65-F5344CB8AC3E}">
-        <p14:creationId xmlns:p14="http://schemas.microsoft.com/office/powerpoint/2010/main" val="831807322"/>
+        <p14:creationId xmlns:p14="http://schemas.microsoft.com/office/powerpoint/2010/main" val="1342404738"/>
       </p:ext>
     </p:extLst>
   </p:cSld>
@@ -6894,6 +6695,1173 @@
       </p:grpSpPr>
       <p:sp>
         <p:nvSpPr>
+          <p:cNvPr id="2" name="Title 1">
+            <a:extLst>
+              <a:ext uri="{FF2B5EF4-FFF2-40B4-BE49-F238E27FC236}">
+                <a16:creationId xmlns:a16="http://schemas.microsoft.com/office/drawing/2014/main" id="{D21C5ED5-3FA6-4C97-A00E-00422E6D8CC6}"/>
+              </a:ext>
+            </a:extLst>
+          </p:cNvPr>
+          <p:cNvSpPr>
+            <a:spLocks noGrp="1"/>
+          </p:cNvSpPr>
+          <p:nvPr>
+            <p:ph type="title"/>
+          </p:nvPr>
+        </p:nvSpPr>
+        <p:spPr/>
+        <p:txBody>
+          <a:bodyPr/>
+          <a:lstStyle/>
+          <a:p>
+            <a:r>
+              <a:rPr lang="en-US" dirty="0"/>
+              <a:t>Language features</a:t>
+            </a:r>
+            <a:endParaRPr lang="LID4096" dirty="0"/>
+          </a:p>
+        </p:txBody>
+      </p:sp>
+      <p:sp>
+        <p:nvSpPr>
+          <p:cNvPr id="3" name="Content Placeholder 2">
+            <a:extLst>
+              <a:ext uri="{FF2B5EF4-FFF2-40B4-BE49-F238E27FC236}">
+                <a16:creationId xmlns:a16="http://schemas.microsoft.com/office/drawing/2014/main" id="{12017746-5D05-4F33-9E17-91082628B283}"/>
+              </a:ext>
+            </a:extLst>
+          </p:cNvPr>
+          <p:cNvSpPr>
+            <a:spLocks noGrp="1"/>
+          </p:cNvSpPr>
+          <p:nvPr>
+            <p:ph idx="1"/>
+          </p:nvPr>
+        </p:nvSpPr>
+        <p:spPr/>
+        <p:txBody>
+          <a:bodyPr/>
+          <a:lstStyle/>
+          <a:p>
+            <a:r>
+              <a:rPr lang="en-US" dirty="0"/>
+              <a:t>Partial Application</a:t>
+            </a:r>
+          </a:p>
+          <a:p>
+            <a:r>
+              <a:rPr lang="en-US" dirty="0"/>
+              <a:t>Piping (|&gt;)</a:t>
+            </a:r>
+          </a:p>
+          <a:p>
+            <a:r>
+              <a:rPr lang="en-US" dirty="0"/>
+              <a:t>Composition (&gt;&gt;) </a:t>
+            </a:r>
+          </a:p>
+          <a:p>
+            <a:r>
+              <a:rPr lang="en-US" dirty="0"/>
+              <a:t>Type Aliases</a:t>
+            </a:r>
+          </a:p>
+          <a:p>
+            <a:r>
+              <a:rPr lang="en-US" dirty="0"/>
+              <a:t>Unit of Measure</a:t>
+            </a:r>
+          </a:p>
+          <a:p>
+            <a:endParaRPr lang="en-US" dirty="0"/>
+          </a:p>
+          <a:p>
+            <a:endParaRPr lang="LID4096" dirty="0"/>
+          </a:p>
+        </p:txBody>
+      </p:sp>
+    </p:spTree>
+    <p:extLst>
+      <p:ext uri="{BB962C8B-B14F-4D97-AF65-F5344CB8AC3E}">
+        <p14:creationId xmlns:p14="http://schemas.microsoft.com/office/powerpoint/2010/main" val="1994521030"/>
+      </p:ext>
+    </p:extLst>
+  </p:cSld>
+  <p:clrMapOvr>
+    <a:masterClrMapping/>
+  </p:clrMapOvr>
+</p:sld>
+</file>
+
+<file path=ppt/slides/slide12.xml><?xml version="1.0" encoding="utf-8"?>
+<p:sld xmlns:a="http://schemas.openxmlformats.org/drawingml/2006/main" xmlns:r="http://schemas.openxmlformats.org/officeDocument/2006/relationships" xmlns:p="http://schemas.openxmlformats.org/presentationml/2006/main">
+  <p:cSld>
+    <p:spTree>
+      <p:nvGrpSpPr>
+        <p:cNvPr id="1" name=""/>
+        <p:cNvGrpSpPr/>
+        <p:nvPr/>
+      </p:nvGrpSpPr>
+      <p:grpSpPr>
+        <a:xfrm>
+          <a:off x="0" y="0"/>
+          <a:ext cx="0" cy="0"/>
+          <a:chOff x="0" y="0"/>
+          <a:chExt cx="0" cy="0"/>
+        </a:xfrm>
+      </p:grpSpPr>
+      <p:sp>
+        <p:nvSpPr>
+          <p:cNvPr id="2" name="Title 1">
+            <a:extLst>
+              <a:ext uri="{FF2B5EF4-FFF2-40B4-BE49-F238E27FC236}">
+                <a16:creationId xmlns:a16="http://schemas.microsoft.com/office/drawing/2014/main" id="{D21C5ED5-3FA6-4C97-A00E-00422E6D8CC6}"/>
+              </a:ext>
+            </a:extLst>
+          </p:cNvPr>
+          <p:cNvSpPr>
+            <a:spLocks noGrp="1"/>
+          </p:cNvSpPr>
+          <p:nvPr>
+            <p:ph type="title"/>
+          </p:nvPr>
+        </p:nvSpPr>
+        <p:spPr/>
+        <p:txBody>
+          <a:bodyPr/>
+          <a:lstStyle/>
+          <a:p>
+            <a:r>
+              <a:rPr lang="en-US" dirty="0"/>
+              <a:t>Language features</a:t>
+            </a:r>
+            <a:endParaRPr lang="LID4096" dirty="0"/>
+          </a:p>
+        </p:txBody>
+      </p:sp>
+      <p:sp>
+        <p:nvSpPr>
+          <p:cNvPr id="3" name="Content Placeholder 2">
+            <a:extLst>
+              <a:ext uri="{FF2B5EF4-FFF2-40B4-BE49-F238E27FC236}">
+                <a16:creationId xmlns:a16="http://schemas.microsoft.com/office/drawing/2014/main" id="{12017746-5D05-4F33-9E17-91082628B283}"/>
+              </a:ext>
+            </a:extLst>
+          </p:cNvPr>
+          <p:cNvSpPr>
+            <a:spLocks noGrp="1"/>
+          </p:cNvSpPr>
+          <p:nvPr>
+            <p:ph idx="1"/>
+          </p:nvPr>
+        </p:nvSpPr>
+        <p:spPr/>
+        <p:txBody>
+          <a:bodyPr/>
+          <a:lstStyle/>
+          <a:p>
+            <a:r>
+              <a:rPr lang="en-US" dirty="0"/>
+              <a:t>Option type</a:t>
+            </a:r>
+          </a:p>
+          <a:p>
+            <a:r>
+              <a:rPr lang="en-US" dirty="0"/>
+              <a:t>Result type</a:t>
+            </a:r>
+          </a:p>
+          <a:p>
+            <a:r>
+              <a:rPr lang="en-US" dirty="0"/>
+              <a:t>Railway Oriented Programming</a:t>
+            </a:r>
+          </a:p>
+          <a:p>
+            <a:r>
+              <a:rPr lang="en-US" dirty="0"/>
+              <a:t>Computation Expressions</a:t>
+            </a:r>
+          </a:p>
+          <a:p>
+            <a:r>
+              <a:rPr lang="en-US" dirty="0" err="1"/>
+              <a:t>Async</a:t>
+            </a:r>
+            <a:endParaRPr lang="en-US" dirty="0"/>
+          </a:p>
+          <a:p>
+            <a:endParaRPr lang="en-US" dirty="0"/>
+          </a:p>
+          <a:p>
+            <a:endParaRPr lang="LID4096" dirty="0"/>
+          </a:p>
+        </p:txBody>
+      </p:sp>
+    </p:spTree>
+    <p:extLst>
+      <p:ext uri="{BB962C8B-B14F-4D97-AF65-F5344CB8AC3E}">
+        <p14:creationId xmlns:p14="http://schemas.microsoft.com/office/powerpoint/2010/main" val="3134305664"/>
+      </p:ext>
+    </p:extLst>
+  </p:cSld>
+  <p:clrMapOvr>
+    <a:masterClrMapping/>
+  </p:clrMapOvr>
+</p:sld>
+</file>
+
+<file path=ppt/slides/slide13.xml><?xml version="1.0" encoding="utf-8"?>
+<p:sld xmlns:a="http://schemas.openxmlformats.org/drawingml/2006/main" xmlns:r="http://schemas.openxmlformats.org/officeDocument/2006/relationships" xmlns:p="http://schemas.openxmlformats.org/presentationml/2006/main">
+  <p:cSld>
+    <p:spTree>
+      <p:nvGrpSpPr>
+        <p:cNvPr id="1" name=""/>
+        <p:cNvGrpSpPr/>
+        <p:nvPr/>
+      </p:nvGrpSpPr>
+      <p:grpSpPr>
+        <a:xfrm>
+          <a:off x="0" y="0"/>
+          <a:ext cx="0" cy="0"/>
+          <a:chOff x="0" y="0"/>
+          <a:chExt cx="0" cy="0"/>
+        </a:xfrm>
+      </p:grpSpPr>
+      <p:sp>
+        <p:nvSpPr>
+          <p:cNvPr id="2" name="Title 1">
+            <a:extLst>
+              <a:ext uri="{FF2B5EF4-FFF2-40B4-BE49-F238E27FC236}">
+                <a16:creationId xmlns:a16="http://schemas.microsoft.com/office/drawing/2014/main" id="{A49AC9B1-52C2-4339-91A5-CFB58942EDCB}"/>
+              </a:ext>
+            </a:extLst>
+          </p:cNvPr>
+          <p:cNvSpPr>
+            <a:spLocks noGrp="1"/>
+          </p:cNvSpPr>
+          <p:nvPr>
+            <p:ph type="title"/>
+          </p:nvPr>
+        </p:nvSpPr>
+        <p:spPr/>
+        <p:txBody>
+          <a:bodyPr/>
+          <a:lstStyle/>
+          <a:p>
+            <a:r>
+              <a:rPr lang="en-US" dirty="0"/>
+              <a:t>Giraffe</a:t>
+            </a:r>
+            <a:endParaRPr lang="LID4096" dirty="0"/>
+          </a:p>
+        </p:txBody>
+      </p:sp>
+      <p:sp>
+        <p:nvSpPr>
+          <p:cNvPr id="3" name="Text Placeholder 2">
+            <a:extLst>
+              <a:ext uri="{FF2B5EF4-FFF2-40B4-BE49-F238E27FC236}">
+                <a16:creationId xmlns:a16="http://schemas.microsoft.com/office/drawing/2014/main" id="{93F7D11D-F8DD-46FA-B9D6-BF127C2C9BB9}"/>
+              </a:ext>
+            </a:extLst>
+          </p:cNvPr>
+          <p:cNvSpPr>
+            <a:spLocks noGrp="1"/>
+          </p:cNvSpPr>
+          <p:nvPr>
+            <p:ph type="body" sz="quarter" idx="10"/>
+          </p:nvPr>
+        </p:nvSpPr>
+        <p:spPr/>
+        <p:txBody>
+          <a:bodyPr/>
+          <a:lstStyle/>
+          <a:p>
+            <a:r>
+              <a:rPr lang="en-US" dirty="0"/>
+              <a:t>1</a:t>
+            </a:r>
+            <a:endParaRPr lang="LID4096" dirty="0"/>
+          </a:p>
+        </p:txBody>
+      </p:sp>
+      <p:sp>
+        <p:nvSpPr>
+          <p:cNvPr id="4" name="Text Placeholder 3">
+            <a:extLst>
+              <a:ext uri="{FF2B5EF4-FFF2-40B4-BE49-F238E27FC236}">
+                <a16:creationId xmlns:a16="http://schemas.microsoft.com/office/drawing/2014/main" id="{A9CED24F-0CD2-4AF0-87D5-EF29159FE80B}"/>
+              </a:ext>
+            </a:extLst>
+          </p:cNvPr>
+          <p:cNvSpPr>
+            <a:spLocks noGrp="1"/>
+          </p:cNvSpPr>
+          <p:nvPr>
+            <p:ph type="body" sz="quarter" idx="11"/>
+          </p:nvPr>
+        </p:nvSpPr>
+        <p:spPr/>
+        <p:txBody>
+          <a:bodyPr/>
+          <a:lstStyle/>
+          <a:p>
+            <a:r>
+              <a:rPr lang="en-US" dirty="0" err="1"/>
+              <a:t>AspNetCore</a:t>
+            </a:r>
+            <a:endParaRPr lang="LID4096" dirty="0"/>
+          </a:p>
+        </p:txBody>
+      </p:sp>
+      <p:sp>
+        <p:nvSpPr>
+          <p:cNvPr id="5" name="Text Placeholder 4">
+            <a:extLst>
+              <a:ext uri="{FF2B5EF4-FFF2-40B4-BE49-F238E27FC236}">
+                <a16:creationId xmlns:a16="http://schemas.microsoft.com/office/drawing/2014/main" id="{050F6630-2E97-4C70-A955-DD56C7619DC2}"/>
+              </a:ext>
+            </a:extLst>
+          </p:cNvPr>
+          <p:cNvSpPr>
+            <a:spLocks noGrp="1"/>
+          </p:cNvSpPr>
+          <p:nvPr>
+            <p:ph type="body" sz="quarter" idx="12"/>
+          </p:nvPr>
+        </p:nvSpPr>
+        <p:spPr/>
+        <p:txBody>
+          <a:bodyPr/>
+          <a:lstStyle/>
+          <a:p>
+            <a:r>
+              <a:rPr lang="en-US" dirty="0"/>
+              <a:t>2</a:t>
+            </a:r>
+            <a:endParaRPr lang="LID4096" dirty="0"/>
+          </a:p>
+        </p:txBody>
+      </p:sp>
+      <p:sp>
+        <p:nvSpPr>
+          <p:cNvPr id="6" name="Text Placeholder 5">
+            <a:extLst>
+              <a:ext uri="{FF2B5EF4-FFF2-40B4-BE49-F238E27FC236}">
+                <a16:creationId xmlns:a16="http://schemas.microsoft.com/office/drawing/2014/main" id="{54FCB7DD-9227-4CC2-A5EC-B5AED6B7FEE1}"/>
+              </a:ext>
+            </a:extLst>
+          </p:cNvPr>
+          <p:cNvSpPr>
+            <a:spLocks noGrp="1"/>
+          </p:cNvSpPr>
+          <p:nvPr>
+            <p:ph type="body" sz="quarter" idx="13"/>
+          </p:nvPr>
+        </p:nvSpPr>
+        <p:spPr/>
+        <p:txBody>
+          <a:bodyPr/>
+          <a:lstStyle/>
+          <a:p>
+            <a:r>
+              <a:rPr lang="en-US" dirty="0"/>
+              <a:t>Suave</a:t>
+            </a:r>
+            <a:endParaRPr lang="LID4096" dirty="0"/>
+          </a:p>
+        </p:txBody>
+      </p:sp>
+      <p:sp>
+        <p:nvSpPr>
+          <p:cNvPr id="7" name="Text Placeholder 6">
+            <a:extLst>
+              <a:ext uri="{FF2B5EF4-FFF2-40B4-BE49-F238E27FC236}">
+                <a16:creationId xmlns:a16="http://schemas.microsoft.com/office/drawing/2014/main" id="{A750C8D1-DAAB-42F5-BAE1-880AE4FB6C51}"/>
+              </a:ext>
+            </a:extLst>
+          </p:cNvPr>
+          <p:cNvSpPr>
+            <a:spLocks noGrp="1"/>
+          </p:cNvSpPr>
+          <p:nvPr>
+            <p:ph type="body" sz="quarter" idx="14"/>
+          </p:nvPr>
+        </p:nvSpPr>
+        <p:spPr/>
+        <p:txBody>
+          <a:bodyPr/>
+          <a:lstStyle/>
+          <a:p>
+            <a:r>
+              <a:rPr lang="en-US" dirty="0"/>
+              <a:t>3</a:t>
+            </a:r>
+            <a:endParaRPr lang="LID4096" dirty="0"/>
+          </a:p>
+        </p:txBody>
+      </p:sp>
+      <p:sp>
+        <p:nvSpPr>
+          <p:cNvPr id="8" name="Text Placeholder 7">
+            <a:extLst>
+              <a:ext uri="{FF2B5EF4-FFF2-40B4-BE49-F238E27FC236}">
+                <a16:creationId xmlns:a16="http://schemas.microsoft.com/office/drawing/2014/main" id="{0B350FA3-F71F-4DA3-BF3C-727608F86362}"/>
+              </a:ext>
+            </a:extLst>
+          </p:cNvPr>
+          <p:cNvSpPr>
+            <a:spLocks noGrp="1"/>
+          </p:cNvSpPr>
+          <p:nvPr>
+            <p:ph type="body" sz="quarter" idx="15"/>
+          </p:nvPr>
+        </p:nvSpPr>
+        <p:spPr/>
+        <p:txBody>
+          <a:bodyPr/>
+          <a:lstStyle/>
+          <a:p>
+            <a:r>
+              <a:rPr lang="en-US" dirty="0"/>
+              <a:t>Base constructs</a:t>
+            </a:r>
+            <a:endParaRPr lang="LID4096" dirty="0"/>
+          </a:p>
+        </p:txBody>
+      </p:sp>
+      <p:sp>
+        <p:nvSpPr>
+          <p:cNvPr id="9" name="Text Placeholder 8">
+            <a:extLst>
+              <a:ext uri="{FF2B5EF4-FFF2-40B4-BE49-F238E27FC236}">
+                <a16:creationId xmlns:a16="http://schemas.microsoft.com/office/drawing/2014/main" id="{4DA4446A-5F74-4190-AEDB-4296399CB319}"/>
+              </a:ext>
+            </a:extLst>
+          </p:cNvPr>
+          <p:cNvSpPr>
+            <a:spLocks noGrp="1"/>
+          </p:cNvSpPr>
+          <p:nvPr>
+            <p:ph type="body" sz="quarter" idx="16"/>
+          </p:nvPr>
+        </p:nvSpPr>
+        <p:spPr/>
+        <p:txBody>
+          <a:bodyPr/>
+          <a:lstStyle/>
+          <a:p>
+            <a:r>
+              <a:rPr lang="en-US" dirty="0"/>
+              <a:t>4</a:t>
+            </a:r>
+            <a:endParaRPr lang="LID4096" dirty="0"/>
+          </a:p>
+        </p:txBody>
+      </p:sp>
+      <p:sp>
+        <p:nvSpPr>
+          <p:cNvPr id="10" name="Text Placeholder 9">
+            <a:extLst>
+              <a:ext uri="{FF2B5EF4-FFF2-40B4-BE49-F238E27FC236}">
+                <a16:creationId xmlns:a16="http://schemas.microsoft.com/office/drawing/2014/main" id="{97F0D131-FA16-4324-8B52-75179D83A297}"/>
+              </a:ext>
+            </a:extLst>
+          </p:cNvPr>
+          <p:cNvSpPr>
+            <a:spLocks noGrp="1"/>
+          </p:cNvSpPr>
+          <p:nvPr>
+            <p:ph type="body" sz="quarter" idx="17"/>
+          </p:nvPr>
+        </p:nvSpPr>
+        <p:spPr/>
+        <p:txBody>
+          <a:bodyPr/>
+          <a:lstStyle/>
+          <a:p>
+            <a:r>
+              <a:rPr lang="en-US" dirty="0"/>
+              <a:t>Http handlers</a:t>
+            </a:r>
+            <a:endParaRPr lang="LID4096" dirty="0"/>
+          </a:p>
+        </p:txBody>
+      </p:sp>
+      <p:sp>
+        <p:nvSpPr>
+          <p:cNvPr id="11" name="Text Placeholder 10">
+            <a:extLst>
+              <a:ext uri="{FF2B5EF4-FFF2-40B4-BE49-F238E27FC236}">
+                <a16:creationId xmlns:a16="http://schemas.microsoft.com/office/drawing/2014/main" id="{D6D6CFA7-AE1C-49AE-8D2F-68A6D1D9A529}"/>
+              </a:ext>
+            </a:extLst>
+          </p:cNvPr>
+          <p:cNvSpPr>
+            <a:spLocks noGrp="1"/>
+          </p:cNvSpPr>
+          <p:nvPr>
+            <p:ph type="body" sz="quarter" idx="18"/>
+          </p:nvPr>
+        </p:nvSpPr>
+        <p:spPr/>
+        <p:txBody>
+          <a:bodyPr/>
+          <a:lstStyle/>
+          <a:p>
+            <a:r>
+              <a:rPr lang="en-US" dirty="0"/>
+              <a:t>5</a:t>
+            </a:r>
+            <a:endParaRPr lang="LID4096" dirty="0"/>
+          </a:p>
+        </p:txBody>
+      </p:sp>
+      <p:sp>
+        <p:nvSpPr>
+          <p:cNvPr id="12" name="Text Placeholder 11">
+            <a:extLst>
+              <a:ext uri="{FF2B5EF4-FFF2-40B4-BE49-F238E27FC236}">
+                <a16:creationId xmlns:a16="http://schemas.microsoft.com/office/drawing/2014/main" id="{4E00A03E-F0A1-4745-AA4D-53376B0664FB}"/>
+              </a:ext>
+            </a:extLst>
+          </p:cNvPr>
+          <p:cNvSpPr>
+            <a:spLocks noGrp="1"/>
+          </p:cNvSpPr>
+          <p:nvPr>
+            <p:ph type="body" sz="quarter" idx="19"/>
+          </p:nvPr>
+        </p:nvSpPr>
+        <p:spPr/>
+        <p:txBody>
+          <a:bodyPr/>
+          <a:lstStyle/>
+          <a:p>
+            <a:r>
+              <a:rPr lang="en-US" dirty="0"/>
+              <a:t>Sample application</a:t>
+            </a:r>
+            <a:endParaRPr lang="LID4096" dirty="0"/>
+          </a:p>
+        </p:txBody>
+      </p:sp>
+    </p:spTree>
+    <p:extLst>
+      <p:ext uri="{BB962C8B-B14F-4D97-AF65-F5344CB8AC3E}">
+        <p14:creationId xmlns:p14="http://schemas.microsoft.com/office/powerpoint/2010/main" val="831807322"/>
+      </p:ext>
+    </p:extLst>
+  </p:cSld>
+  <p:clrMapOvr>
+    <a:masterClrMapping/>
+  </p:clrMapOvr>
+</p:sld>
+</file>
+
+<file path=ppt/slides/slide14.xml><?xml version="1.0" encoding="utf-8"?>
+<p:sld xmlns:a="http://schemas.openxmlformats.org/drawingml/2006/main" xmlns:r="http://schemas.openxmlformats.org/officeDocument/2006/relationships" xmlns:p="http://schemas.openxmlformats.org/presentationml/2006/main">
+  <p:cSld>
+    <p:spTree>
+      <p:nvGrpSpPr>
+        <p:cNvPr id="1" name=""/>
+        <p:cNvGrpSpPr/>
+        <p:nvPr/>
+      </p:nvGrpSpPr>
+      <p:grpSpPr>
+        <a:xfrm>
+          <a:off x="0" y="0"/>
+          <a:ext cx="0" cy="0"/>
+          <a:chOff x="0" y="0"/>
+          <a:chExt cx="0" cy="0"/>
+        </a:xfrm>
+      </p:grpSpPr>
+      <p:sp>
+        <p:nvSpPr>
+          <p:cNvPr id="13" name="Title 12">
+            <a:extLst>
+              <a:ext uri="{FF2B5EF4-FFF2-40B4-BE49-F238E27FC236}">
+                <a16:creationId xmlns:a16="http://schemas.microsoft.com/office/drawing/2014/main" id="{E6EF630A-3374-4FD8-AA0C-475A6956180F}"/>
+              </a:ext>
+            </a:extLst>
+          </p:cNvPr>
+          <p:cNvSpPr>
+            <a:spLocks noGrp="1"/>
+          </p:cNvSpPr>
+          <p:nvPr>
+            <p:ph type="title"/>
+          </p:nvPr>
+        </p:nvSpPr>
+        <p:spPr/>
+        <p:txBody>
+          <a:bodyPr/>
+          <a:lstStyle/>
+          <a:p>
+            <a:r>
+              <a:rPr lang="en-US" dirty="0"/>
+              <a:t>Giraffe – </a:t>
+            </a:r>
+            <a:r>
+              <a:rPr lang="en-US" dirty="0" err="1"/>
+              <a:t>AspNetCore</a:t>
+            </a:r>
+            <a:endParaRPr lang="LID4096" dirty="0"/>
+          </a:p>
+        </p:txBody>
+      </p:sp>
+      <p:sp>
+        <p:nvSpPr>
+          <p:cNvPr id="14" name="Content Placeholder 13">
+            <a:extLst>
+              <a:ext uri="{FF2B5EF4-FFF2-40B4-BE49-F238E27FC236}">
+                <a16:creationId xmlns:a16="http://schemas.microsoft.com/office/drawing/2014/main" id="{7EC7517F-BD91-4BCB-91A0-23065AB52C8B}"/>
+              </a:ext>
+            </a:extLst>
+          </p:cNvPr>
+          <p:cNvSpPr>
+            <a:spLocks noGrp="1"/>
+          </p:cNvSpPr>
+          <p:nvPr>
+            <p:ph idx="1"/>
+          </p:nvPr>
+        </p:nvSpPr>
+        <p:spPr/>
+        <p:txBody>
+          <a:bodyPr/>
+          <a:lstStyle/>
+          <a:p>
+            <a:r>
+              <a:rPr lang="en-US" dirty="0"/>
+              <a:t>Microsoft supported</a:t>
+            </a:r>
+          </a:p>
+          <a:p>
+            <a:r>
+              <a:rPr lang="en-US" dirty="0"/>
+              <a:t>Default template too OO</a:t>
+            </a:r>
+          </a:p>
+          <a:p>
+            <a:r>
+              <a:rPr lang="en-US" dirty="0"/>
+              <a:t>Giraffe = Functional counterpart</a:t>
+            </a:r>
+          </a:p>
+          <a:p>
+            <a:r>
+              <a:rPr lang="en-US" dirty="0"/>
+              <a:t>Micro framework on top</a:t>
+            </a:r>
+            <a:endParaRPr lang="LID4096" dirty="0"/>
+          </a:p>
+        </p:txBody>
+      </p:sp>
+    </p:spTree>
+    <p:extLst>
+      <p:ext uri="{BB962C8B-B14F-4D97-AF65-F5344CB8AC3E}">
+        <p14:creationId xmlns:p14="http://schemas.microsoft.com/office/powerpoint/2010/main" val="3690296249"/>
+      </p:ext>
+    </p:extLst>
+  </p:cSld>
+  <p:clrMapOvr>
+    <a:masterClrMapping/>
+  </p:clrMapOvr>
+</p:sld>
+</file>
+
+<file path=ppt/slides/slide15.xml><?xml version="1.0" encoding="utf-8"?>
+<p:sld xmlns:a="http://schemas.openxmlformats.org/drawingml/2006/main" xmlns:r="http://schemas.openxmlformats.org/officeDocument/2006/relationships" xmlns:p="http://schemas.openxmlformats.org/presentationml/2006/main">
+  <p:cSld>
+    <p:spTree>
+      <p:nvGrpSpPr>
+        <p:cNvPr id="1" name=""/>
+        <p:cNvGrpSpPr/>
+        <p:nvPr/>
+      </p:nvGrpSpPr>
+      <p:grpSpPr>
+        <a:xfrm>
+          <a:off x="0" y="0"/>
+          <a:ext cx="0" cy="0"/>
+          <a:chOff x="0" y="0"/>
+          <a:chExt cx="0" cy="0"/>
+        </a:xfrm>
+      </p:grpSpPr>
+      <p:sp>
+        <p:nvSpPr>
+          <p:cNvPr id="13" name="Title 12">
+            <a:extLst>
+              <a:ext uri="{FF2B5EF4-FFF2-40B4-BE49-F238E27FC236}">
+                <a16:creationId xmlns:a16="http://schemas.microsoft.com/office/drawing/2014/main" id="{E6EF630A-3374-4FD8-AA0C-475A6956180F}"/>
+              </a:ext>
+            </a:extLst>
+          </p:cNvPr>
+          <p:cNvSpPr>
+            <a:spLocks noGrp="1"/>
+          </p:cNvSpPr>
+          <p:nvPr>
+            <p:ph type="title"/>
+          </p:nvPr>
+        </p:nvSpPr>
+        <p:spPr/>
+        <p:txBody>
+          <a:bodyPr/>
+          <a:lstStyle/>
+          <a:p>
+            <a:r>
+              <a:rPr lang="en-US" dirty="0"/>
+              <a:t>Giraffe – Suave</a:t>
+            </a:r>
+            <a:endParaRPr lang="LID4096" dirty="0"/>
+          </a:p>
+        </p:txBody>
+      </p:sp>
+      <p:sp>
+        <p:nvSpPr>
+          <p:cNvPr id="14" name="Content Placeholder 13">
+            <a:extLst>
+              <a:ext uri="{FF2B5EF4-FFF2-40B4-BE49-F238E27FC236}">
+                <a16:creationId xmlns:a16="http://schemas.microsoft.com/office/drawing/2014/main" id="{7EC7517F-BD91-4BCB-91A0-23065AB52C8B}"/>
+              </a:ext>
+            </a:extLst>
+          </p:cNvPr>
+          <p:cNvSpPr>
+            <a:spLocks noGrp="1"/>
+          </p:cNvSpPr>
+          <p:nvPr>
+            <p:ph idx="1"/>
+          </p:nvPr>
+        </p:nvSpPr>
+        <p:spPr/>
+        <p:txBody>
+          <a:bodyPr/>
+          <a:lstStyle/>
+          <a:p>
+            <a:r>
+              <a:rPr lang="en-US" dirty="0"/>
+              <a:t>F# web development library</a:t>
+            </a:r>
+          </a:p>
+          <a:p>
+            <a:r>
+              <a:rPr lang="en-US" dirty="0" err="1"/>
+              <a:t>WebParts</a:t>
+            </a:r>
+            <a:endParaRPr lang="en-US" dirty="0"/>
+          </a:p>
+          <a:p>
+            <a:r>
+              <a:rPr lang="en-US" dirty="0"/>
+              <a:t>Functional pipeline</a:t>
+            </a:r>
+          </a:p>
+          <a:p>
+            <a:r>
+              <a:rPr lang="en-US" dirty="0"/>
+              <a:t>Linux support before it was cool</a:t>
+            </a:r>
+          </a:p>
+          <a:p>
+            <a:r>
+              <a:rPr lang="en-US" dirty="0"/>
+              <a:t>Custom http stack</a:t>
+            </a:r>
+            <a:endParaRPr lang="LID4096" dirty="0"/>
+          </a:p>
+        </p:txBody>
+      </p:sp>
+    </p:spTree>
+    <p:extLst>
+      <p:ext uri="{BB962C8B-B14F-4D97-AF65-F5344CB8AC3E}">
+        <p14:creationId xmlns:p14="http://schemas.microsoft.com/office/powerpoint/2010/main" val="2367338762"/>
+      </p:ext>
+    </p:extLst>
+  </p:cSld>
+  <p:clrMapOvr>
+    <a:masterClrMapping/>
+  </p:clrMapOvr>
+</p:sld>
+</file>
+
+<file path=ppt/slides/slide16.xml><?xml version="1.0" encoding="utf-8"?>
+<p:sld xmlns:a="http://schemas.openxmlformats.org/drawingml/2006/main" xmlns:r="http://schemas.openxmlformats.org/officeDocument/2006/relationships" xmlns:p="http://schemas.openxmlformats.org/presentationml/2006/main">
+  <p:cSld>
+    <p:spTree>
+      <p:nvGrpSpPr>
+        <p:cNvPr id="1" name=""/>
+        <p:cNvGrpSpPr/>
+        <p:nvPr/>
+      </p:nvGrpSpPr>
+      <p:grpSpPr>
+        <a:xfrm>
+          <a:off x="0" y="0"/>
+          <a:ext cx="0" cy="0"/>
+          <a:chOff x="0" y="0"/>
+          <a:chExt cx="0" cy="0"/>
+        </a:xfrm>
+      </p:grpSpPr>
+      <p:sp>
+        <p:nvSpPr>
+          <p:cNvPr id="2" name="Title 1">
+            <a:extLst>
+              <a:ext uri="{FF2B5EF4-FFF2-40B4-BE49-F238E27FC236}">
+                <a16:creationId xmlns:a16="http://schemas.microsoft.com/office/drawing/2014/main" id="{6766AE8B-3149-472F-B90E-42D7C6B5C164}"/>
+              </a:ext>
+            </a:extLst>
+          </p:cNvPr>
+          <p:cNvSpPr>
+            <a:spLocks noGrp="1"/>
+          </p:cNvSpPr>
+          <p:nvPr>
+            <p:ph type="title"/>
+          </p:nvPr>
+        </p:nvSpPr>
+        <p:spPr/>
+        <p:txBody>
+          <a:bodyPr/>
+          <a:lstStyle/>
+          <a:p>
+            <a:r>
+              <a:rPr lang="en-US" dirty="0"/>
+              <a:t>Giraffe - Base constructs</a:t>
+            </a:r>
+            <a:endParaRPr lang="LID4096" dirty="0"/>
+          </a:p>
+        </p:txBody>
+      </p:sp>
+      <p:sp>
+        <p:nvSpPr>
+          <p:cNvPr id="3" name="Content Placeholder 2">
+            <a:extLst>
+              <a:ext uri="{FF2B5EF4-FFF2-40B4-BE49-F238E27FC236}">
+                <a16:creationId xmlns:a16="http://schemas.microsoft.com/office/drawing/2014/main" id="{8976C7DC-F041-49FD-B42E-46FEC3786D44}"/>
+              </a:ext>
+            </a:extLst>
+          </p:cNvPr>
+          <p:cNvSpPr>
+            <a:spLocks noGrp="1"/>
+          </p:cNvSpPr>
+          <p:nvPr>
+            <p:ph idx="1"/>
+          </p:nvPr>
+        </p:nvSpPr>
+        <p:spPr/>
+        <p:txBody>
+          <a:bodyPr/>
+          <a:lstStyle/>
+          <a:p>
+            <a:r>
+              <a:rPr lang="en-US" dirty="0" err="1"/>
+              <a:t>HttpHandler</a:t>
+            </a:r>
+            <a:endParaRPr lang="en-US" dirty="0"/>
+          </a:p>
+          <a:p>
+            <a:pPr lvl="1"/>
+            <a:r>
+              <a:rPr lang="en-US" dirty="0" err="1"/>
+              <a:t>HttpFuncResult</a:t>
+            </a:r>
+            <a:endParaRPr lang="en-US" dirty="0"/>
+          </a:p>
+          <a:p>
+            <a:pPr lvl="1"/>
+            <a:r>
+              <a:rPr lang="en-US" dirty="0" err="1"/>
+              <a:t>HttpFunc</a:t>
+            </a:r>
+            <a:endParaRPr lang="en-US" dirty="0"/>
+          </a:p>
+          <a:p>
+            <a:r>
+              <a:rPr lang="en-US" dirty="0"/>
+              <a:t>Combinators</a:t>
+            </a:r>
+          </a:p>
+          <a:p>
+            <a:pPr lvl="1"/>
+            <a:r>
+              <a:rPr lang="en-US" dirty="0"/>
+              <a:t>Compose (&gt;=&gt;)</a:t>
+            </a:r>
+          </a:p>
+          <a:p>
+            <a:pPr lvl="1"/>
+            <a:r>
+              <a:rPr lang="en-US" dirty="0"/>
+              <a:t>Choose</a:t>
+            </a:r>
+          </a:p>
+          <a:p>
+            <a:r>
+              <a:rPr lang="en-US" dirty="0"/>
+              <a:t>Tasks</a:t>
+            </a:r>
+          </a:p>
+        </p:txBody>
+      </p:sp>
+    </p:spTree>
+    <p:extLst>
+      <p:ext uri="{BB962C8B-B14F-4D97-AF65-F5344CB8AC3E}">
+        <p14:creationId xmlns:p14="http://schemas.microsoft.com/office/powerpoint/2010/main" val="924677961"/>
+      </p:ext>
+    </p:extLst>
+  </p:cSld>
+  <p:clrMapOvr>
+    <a:masterClrMapping/>
+  </p:clrMapOvr>
+</p:sld>
+</file>
+
+<file path=ppt/slides/slide17.xml><?xml version="1.0" encoding="utf-8"?>
+<p:sld xmlns:a="http://schemas.openxmlformats.org/drawingml/2006/main" xmlns:r="http://schemas.openxmlformats.org/officeDocument/2006/relationships" xmlns:p="http://schemas.openxmlformats.org/presentationml/2006/main">
+  <p:cSld>
+    <p:spTree>
+      <p:nvGrpSpPr>
+        <p:cNvPr id="1" name=""/>
+        <p:cNvGrpSpPr/>
+        <p:nvPr/>
+      </p:nvGrpSpPr>
+      <p:grpSpPr>
+        <a:xfrm>
+          <a:off x="0" y="0"/>
+          <a:ext cx="0" cy="0"/>
+          <a:chOff x="0" y="0"/>
+          <a:chExt cx="0" cy="0"/>
+        </a:xfrm>
+      </p:grpSpPr>
+      <p:sp>
+        <p:nvSpPr>
+          <p:cNvPr id="2" name="Title 1">
+            <a:extLst>
+              <a:ext uri="{FF2B5EF4-FFF2-40B4-BE49-F238E27FC236}">
+                <a16:creationId xmlns:a16="http://schemas.microsoft.com/office/drawing/2014/main" id="{6766AE8B-3149-472F-B90E-42D7C6B5C164}"/>
+              </a:ext>
+            </a:extLst>
+          </p:cNvPr>
+          <p:cNvSpPr>
+            <a:spLocks noGrp="1"/>
+          </p:cNvSpPr>
+          <p:nvPr>
+            <p:ph type="title"/>
+          </p:nvPr>
+        </p:nvSpPr>
+        <p:spPr/>
+        <p:txBody>
+          <a:bodyPr/>
+          <a:lstStyle/>
+          <a:p>
+            <a:r>
+              <a:rPr lang="en-US" dirty="0"/>
+              <a:t>Giraffe - Http handlers</a:t>
+            </a:r>
+            <a:endParaRPr lang="LID4096" dirty="0"/>
+          </a:p>
+        </p:txBody>
+      </p:sp>
+      <p:sp>
+        <p:nvSpPr>
+          <p:cNvPr id="3" name="Content Placeholder 2">
+            <a:extLst>
+              <a:ext uri="{FF2B5EF4-FFF2-40B4-BE49-F238E27FC236}">
+                <a16:creationId xmlns:a16="http://schemas.microsoft.com/office/drawing/2014/main" id="{8976C7DC-F041-49FD-B42E-46FEC3786D44}"/>
+              </a:ext>
+            </a:extLst>
+          </p:cNvPr>
+          <p:cNvSpPr>
+            <a:spLocks noGrp="1"/>
+          </p:cNvSpPr>
+          <p:nvPr>
+            <p:ph idx="1"/>
+          </p:nvPr>
+        </p:nvSpPr>
+        <p:spPr/>
+        <p:txBody>
+          <a:bodyPr/>
+          <a:lstStyle/>
+          <a:p>
+            <a:r>
+              <a:rPr lang="en-US" dirty="0"/>
+              <a:t>GET, POST, PUT, PATCH, DELETE</a:t>
+            </a:r>
+          </a:p>
+          <a:p>
+            <a:r>
+              <a:rPr lang="en-US" dirty="0"/>
+              <a:t>route(f)</a:t>
+            </a:r>
+          </a:p>
+          <a:p>
+            <a:r>
+              <a:rPr lang="en-US" dirty="0" err="1"/>
+              <a:t>subRoute</a:t>
+            </a:r>
+            <a:endParaRPr lang="en-US" dirty="0"/>
+          </a:p>
+          <a:p>
+            <a:r>
+              <a:rPr lang="en-US" dirty="0"/>
+              <a:t>text, </a:t>
+            </a:r>
+            <a:r>
+              <a:rPr lang="en-US" dirty="0" err="1"/>
+              <a:t>json</a:t>
+            </a:r>
+            <a:r>
+              <a:rPr lang="en-US" dirty="0"/>
+              <a:t>, xml, </a:t>
+            </a:r>
+            <a:r>
+              <a:rPr lang="en-US" dirty="0" err="1"/>
+              <a:t>htmlFile</a:t>
+            </a:r>
+            <a:endParaRPr lang="en-US" dirty="0"/>
+          </a:p>
+          <a:p>
+            <a:r>
+              <a:rPr lang="en-US" dirty="0" err="1"/>
+              <a:t>renderHtml</a:t>
+            </a:r>
+            <a:r>
+              <a:rPr lang="en-US" dirty="0"/>
+              <a:t>, </a:t>
+            </a:r>
+            <a:r>
+              <a:rPr lang="en-US" dirty="0" err="1"/>
+              <a:t>razorView</a:t>
+            </a:r>
+            <a:endParaRPr lang="en-US" dirty="0"/>
+          </a:p>
+          <a:p>
+            <a:r>
+              <a:rPr lang="en-US" dirty="0"/>
+              <a:t>model binding</a:t>
+            </a:r>
+          </a:p>
+          <a:p>
+            <a:r>
+              <a:rPr lang="en-US" dirty="0"/>
+              <a:t>Custom!</a:t>
+            </a:r>
+          </a:p>
+        </p:txBody>
+      </p:sp>
+    </p:spTree>
+    <p:extLst>
+      <p:ext uri="{BB962C8B-B14F-4D97-AF65-F5344CB8AC3E}">
+        <p14:creationId xmlns:p14="http://schemas.microsoft.com/office/powerpoint/2010/main" val="336408992"/>
+      </p:ext>
+    </p:extLst>
+  </p:cSld>
+  <p:clrMapOvr>
+    <a:masterClrMapping/>
+  </p:clrMapOvr>
+</p:sld>
+</file>
+
+<file path=ppt/slides/slide18.xml><?xml version="1.0" encoding="utf-8"?>
+<p:sld xmlns:a="http://schemas.openxmlformats.org/drawingml/2006/main" xmlns:r="http://schemas.openxmlformats.org/officeDocument/2006/relationships" xmlns:p="http://schemas.openxmlformats.org/presentationml/2006/main">
+  <p:cSld>
+    <p:spTree>
+      <p:nvGrpSpPr>
+        <p:cNvPr id="1" name=""/>
+        <p:cNvGrpSpPr/>
+        <p:nvPr/>
+      </p:nvGrpSpPr>
+      <p:grpSpPr>
+        <a:xfrm>
+          <a:off x="0" y="0"/>
+          <a:ext cx="0" cy="0"/>
+          <a:chOff x="0" y="0"/>
+          <a:chExt cx="0" cy="0"/>
+        </a:xfrm>
+      </p:grpSpPr>
+      <p:sp>
+        <p:nvSpPr>
+          <p:cNvPr id="2" name="Title 1">
+            <a:extLst>
+              <a:ext uri="{FF2B5EF4-FFF2-40B4-BE49-F238E27FC236}">
+                <a16:creationId xmlns:a16="http://schemas.microsoft.com/office/drawing/2014/main" id="{9BBE6C90-2A29-46A3-8992-CF9B35A7A4DC}"/>
+              </a:ext>
+            </a:extLst>
+          </p:cNvPr>
+          <p:cNvSpPr>
+            <a:spLocks noGrp="1"/>
+          </p:cNvSpPr>
+          <p:nvPr>
+            <p:ph type="title"/>
+          </p:nvPr>
+        </p:nvSpPr>
+        <p:spPr/>
+        <p:txBody>
+          <a:bodyPr/>
+          <a:lstStyle/>
+          <a:p>
+            <a:r>
+              <a:rPr lang="en-US" dirty="0"/>
+              <a:t>Giraffe - Sample application</a:t>
+            </a:r>
+            <a:endParaRPr lang="LID4096" dirty="0"/>
+          </a:p>
+        </p:txBody>
+      </p:sp>
+      <p:sp>
+        <p:nvSpPr>
+          <p:cNvPr id="3" name="Content Placeholder 2">
+            <a:extLst>
+              <a:ext uri="{FF2B5EF4-FFF2-40B4-BE49-F238E27FC236}">
+                <a16:creationId xmlns:a16="http://schemas.microsoft.com/office/drawing/2014/main" id="{72767576-71C4-4808-BB43-754884265186}"/>
+              </a:ext>
+            </a:extLst>
+          </p:cNvPr>
+          <p:cNvSpPr>
+            <a:spLocks noGrp="1"/>
+          </p:cNvSpPr>
+          <p:nvPr>
+            <p:ph idx="1"/>
+          </p:nvPr>
+        </p:nvSpPr>
+        <p:spPr/>
+        <p:txBody>
+          <a:bodyPr/>
+          <a:lstStyle/>
+          <a:p>
+            <a:endParaRPr lang="LID4096"/>
+          </a:p>
+        </p:txBody>
+      </p:sp>
+    </p:spTree>
+    <p:extLst>
+      <p:ext uri="{BB962C8B-B14F-4D97-AF65-F5344CB8AC3E}">
+        <p14:creationId xmlns:p14="http://schemas.microsoft.com/office/powerpoint/2010/main" val="3160976001"/>
+      </p:ext>
+    </p:extLst>
+  </p:cSld>
+  <p:clrMapOvr>
+    <a:masterClrMapping/>
+  </p:clrMapOvr>
+</p:sld>
+</file>
+
+<file path=ppt/slides/slide19.xml><?xml version="1.0" encoding="utf-8"?>
+<p:sld xmlns:a="http://schemas.openxmlformats.org/drawingml/2006/main" xmlns:r="http://schemas.openxmlformats.org/officeDocument/2006/relationships" xmlns:p="http://schemas.openxmlformats.org/presentationml/2006/main">
+  <p:cSld>
+    <p:spTree>
+      <p:nvGrpSpPr>
+        <p:cNvPr id="1" name=""/>
+        <p:cNvGrpSpPr/>
+        <p:nvPr/>
+      </p:nvGrpSpPr>
+      <p:grpSpPr>
+        <a:xfrm>
+          <a:off x="0" y="0"/>
+          <a:ext cx="0" cy="0"/>
+          <a:chOff x="0" y="0"/>
+          <a:chExt cx="0" cy="0"/>
+        </a:xfrm>
+      </p:grpSpPr>
+      <p:sp>
+        <p:nvSpPr>
           <p:cNvPr id="13" name="Title 12">
             <a:extLst>
               <a:ext uri="{FF2B5EF4-FFF2-40B4-BE49-F238E27FC236}">
@@ -6942,7 +7910,11 @@
           <a:bodyPr/>
           <a:lstStyle/>
           <a:p>
-            <a:endParaRPr lang="LID4096"/>
+            <a:r>
+              <a:rPr lang="en-US" dirty="0"/>
+              <a:t>1</a:t>
+            </a:r>
+            <a:endParaRPr lang="LID4096" dirty="0"/>
           </a:p>
         </p:txBody>
       </p:sp>
@@ -6996,7 +7968,11 @@
           <a:bodyPr/>
           <a:lstStyle/>
           <a:p>
-            <a:endParaRPr lang="LID4096"/>
+            <a:r>
+              <a:rPr lang="en-US" dirty="0"/>
+              <a:t>2</a:t>
+            </a:r>
+            <a:endParaRPr lang="LID4096" dirty="0"/>
           </a:p>
         </p:txBody>
       </p:sp>
@@ -7050,7 +8026,11 @@
           <a:bodyPr/>
           <a:lstStyle/>
           <a:p>
-            <a:endParaRPr lang="LID4096"/>
+            <a:r>
+              <a:rPr lang="en-US" dirty="0"/>
+              <a:t>3</a:t>
+            </a:r>
+            <a:endParaRPr lang="LID4096" dirty="0"/>
           </a:p>
         </p:txBody>
       </p:sp>
@@ -7104,7 +8084,11 @@
           <a:bodyPr/>
           <a:lstStyle/>
           <a:p>
-            <a:endParaRPr lang="LID4096"/>
+            <a:r>
+              <a:rPr lang="en-US" dirty="0"/>
+              <a:t>4</a:t>
+            </a:r>
+            <a:endParaRPr lang="LID4096" dirty="0"/>
           </a:p>
         </p:txBody>
       </p:sp>
@@ -7240,10 +8224,10 @@
       </p:grpSpPr>
       <p:sp>
         <p:nvSpPr>
-          <p:cNvPr id="26" name="Title 25">
+          <p:cNvPr id="3" name="Title 2">
             <a:extLst>
               <a:ext uri="{FF2B5EF4-FFF2-40B4-BE49-F238E27FC236}">
-                <a16:creationId xmlns:a16="http://schemas.microsoft.com/office/drawing/2014/main" id="{5C457036-CBE1-4CDE-9FFF-BB00A7C3C2D8}"/>
+                <a16:creationId xmlns:a16="http://schemas.microsoft.com/office/drawing/2014/main" id="{7FE6D355-C13B-4ABC-B878-22405AEEA4CE}"/>
               </a:ext>
             </a:extLst>
           </p:cNvPr>
@@ -7261,7 +8245,7 @@
           <a:p>
             <a:r>
               <a:rPr lang="en-US" dirty="0"/>
-              <a:t>Introduction</a:t>
+              <a:t>Introduction to F#</a:t>
             </a:r>
             <a:endParaRPr lang="LID4096" dirty="0"/>
           </a:p>
@@ -7269,10 +8253,10 @@
       </p:sp>
       <p:sp>
         <p:nvSpPr>
-          <p:cNvPr id="27" name="Text Placeholder 26">
+          <p:cNvPr id="4" name="Text Placeholder 3">
             <a:extLst>
               <a:ext uri="{FF2B5EF4-FFF2-40B4-BE49-F238E27FC236}">
-                <a16:creationId xmlns:a16="http://schemas.microsoft.com/office/drawing/2014/main" id="{0AA12662-0D7D-4A77-91F1-86695579F40E}"/>
+                <a16:creationId xmlns:a16="http://schemas.microsoft.com/office/drawing/2014/main" id="{CEBC40D3-0AF7-44F7-AB11-699F8B039D3A}"/>
               </a:ext>
             </a:extLst>
           </p:cNvPr>
@@ -7288,16 +8272,20 @@
           <a:bodyPr/>
           <a:lstStyle/>
           <a:p>
-            <a:endParaRPr lang="LID4096"/>
-          </a:p>
-        </p:txBody>
-      </p:sp>
-      <p:sp>
-        <p:nvSpPr>
-          <p:cNvPr id="28" name="Text Placeholder 27">
+            <a:r>
+              <a:rPr lang="en-US" dirty="0"/>
+              <a:t>1</a:t>
+            </a:r>
+            <a:endParaRPr lang="LID4096" dirty="0"/>
+          </a:p>
+        </p:txBody>
+      </p:sp>
+      <p:sp>
+        <p:nvSpPr>
+          <p:cNvPr id="5" name="Text Placeholder 4">
             <a:extLst>
               <a:ext uri="{FF2B5EF4-FFF2-40B4-BE49-F238E27FC236}">
-                <a16:creationId xmlns:a16="http://schemas.microsoft.com/office/drawing/2014/main" id="{1161DE75-FFF4-4B0C-B116-3F1C9914D4BF}"/>
+                <a16:creationId xmlns:a16="http://schemas.microsoft.com/office/drawing/2014/main" id="{51288594-3BB4-4099-B095-577FB6A28E8F}"/>
               </a:ext>
             </a:extLst>
           </p:cNvPr>
@@ -7323,10 +8311,10 @@
       </p:sp>
       <p:sp>
         <p:nvSpPr>
-          <p:cNvPr id="29" name="Text Placeholder 28">
+          <p:cNvPr id="6" name="Text Placeholder 5">
             <a:extLst>
               <a:ext uri="{FF2B5EF4-FFF2-40B4-BE49-F238E27FC236}">
-                <a16:creationId xmlns:a16="http://schemas.microsoft.com/office/drawing/2014/main" id="{8E12D733-1BFB-4DEF-A702-DD86FAED5D0B}"/>
+                <a16:creationId xmlns:a16="http://schemas.microsoft.com/office/drawing/2014/main" id="{37472BFA-D32E-4C8C-98B4-87142A08E48A}"/>
               </a:ext>
             </a:extLst>
           </p:cNvPr>
@@ -7342,16 +8330,20 @@
           <a:bodyPr/>
           <a:lstStyle/>
           <a:p>
-            <a:endParaRPr lang="LID4096"/>
-          </a:p>
-        </p:txBody>
-      </p:sp>
-      <p:sp>
-        <p:nvSpPr>
-          <p:cNvPr id="30" name="Text Placeholder 29">
+            <a:r>
+              <a:rPr lang="en-US" dirty="0"/>
+              <a:t>2</a:t>
+            </a:r>
+            <a:endParaRPr lang="LID4096" dirty="0"/>
+          </a:p>
+        </p:txBody>
+      </p:sp>
+      <p:sp>
+        <p:nvSpPr>
+          <p:cNvPr id="7" name="Text Placeholder 6">
             <a:extLst>
               <a:ext uri="{FF2B5EF4-FFF2-40B4-BE49-F238E27FC236}">
-                <a16:creationId xmlns:a16="http://schemas.microsoft.com/office/drawing/2014/main" id="{9E6BAD06-E6AC-43AA-981A-DEC12D575548}"/>
+                <a16:creationId xmlns:a16="http://schemas.microsoft.com/office/drawing/2014/main" id="{7BEA09CA-414C-4DF9-99A1-3D4819CD9131}"/>
               </a:ext>
             </a:extLst>
           </p:cNvPr>
@@ -7377,10 +8369,10 @@
       </p:sp>
       <p:sp>
         <p:nvSpPr>
-          <p:cNvPr id="31" name="Text Placeholder 30">
+          <p:cNvPr id="8" name="Text Placeholder 7">
             <a:extLst>
               <a:ext uri="{FF2B5EF4-FFF2-40B4-BE49-F238E27FC236}">
-                <a16:creationId xmlns:a16="http://schemas.microsoft.com/office/drawing/2014/main" id="{F6A644EF-F6D1-4EDB-AD2E-EFDCD6DC8B0D}"/>
+                <a16:creationId xmlns:a16="http://schemas.microsoft.com/office/drawing/2014/main" id="{07D5509A-254E-4250-93F8-457209EC8771}"/>
               </a:ext>
             </a:extLst>
           </p:cNvPr>
@@ -7396,16 +8388,20 @@
           <a:bodyPr/>
           <a:lstStyle/>
           <a:p>
-            <a:endParaRPr lang="LID4096"/>
-          </a:p>
-        </p:txBody>
-      </p:sp>
-      <p:sp>
-        <p:nvSpPr>
-          <p:cNvPr id="32" name="Text Placeholder 31">
+            <a:r>
+              <a:rPr lang="en-US" dirty="0"/>
+              <a:t>3</a:t>
+            </a:r>
+            <a:endParaRPr lang="LID4096" dirty="0"/>
+          </a:p>
+        </p:txBody>
+      </p:sp>
+      <p:sp>
+        <p:nvSpPr>
+          <p:cNvPr id="9" name="Text Placeholder 8">
             <a:extLst>
               <a:ext uri="{FF2B5EF4-FFF2-40B4-BE49-F238E27FC236}">
-                <a16:creationId xmlns:a16="http://schemas.microsoft.com/office/drawing/2014/main" id="{A57EC3DE-8796-4AA7-B180-0B66E7533BCE}"/>
+                <a16:creationId xmlns:a16="http://schemas.microsoft.com/office/drawing/2014/main" id="{6E704611-98AF-4F78-8411-88DF345E722D}"/>
               </a:ext>
             </a:extLst>
           </p:cNvPr>
@@ -7431,10 +8427,10 @@
       </p:sp>
       <p:sp>
         <p:nvSpPr>
-          <p:cNvPr id="33" name="Text Placeholder 32">
+          <p:cNvPr id="10" name="Text Placeholder 9">
             <a:extLst>
               <a:ext uri="{FF2B5EF4-FFF2-40B4-BE49-F238E27FC236}">
-                <a16:creationId xmlns:a16="http://schemas.microsoft.com/office/drawing/2014/main" id="{B1D8FF4D-DED9-4EB2-81A8-B4867A39CDC7}"/>
+                <a16:creationId xmlns:a16="http://schemas.microsoft.com/office/drawing/2014/main" id="{25BE6D54-6C4F-4750-93BA-569F7A7A2E05}"/>
               </a:ext>
             </a:extLst>
           </p:cNvPr>
@@ -7450,16 +8446,20 @@
           <a:bodyPr/>
           <a:lstStyle/>
           <a:p>
-            <a:endParaRPr lang="LID4096"/>
-          </a:p>
-        </p:txBody>
-      </p:sp>
-      <p:sp>
-        <p:nvSpPr>
-          <p:cNvPr id="34" name="Text Placeholder 33">
+            <a:r>
+              <a:rPr lang="en-US" dirty="0"/>
+              <a:t>4</a:t>
+            </a:r>
+            <a:endParaRPr lang="LID4096" dirty="0"/>
+          </a:p>
+        </p:txBody>
+      </p:sp>
+      <p:sp>
+        <p:nvSpPr>
+          <p:cNvPr id="11" name="Text Placeholder 10">
             <a:extLst>
               <a:ext uri="{FF2B5EF4-FFF2-40B4-BE49-F238E27FC236}">
-                <a16:creationId xmlns:a16="http://schemas.microsoft.com/office/drawing/2014/main" id="{5D310FC9-94C3-4341-BEFE-60FF3330D621}"/>
+                <a16:creationId xmlns:a16="http://schemas.microsoft.com/office/drawing/2014/main" id="{15FDFBD9-A693-4C91-918F-80BA43AE3D80}"/>
               </a:ext>
             </a:extLst>
           </p:cNvPr>
@@ -7483,64 +8483,10 @@
           </a:p>
         </p:txBody>
       </p:sp>
-      <p:sp>
-        <p:nvSpPr>
-          <p:cNvPr id="35" name="Text Placeholder 34">
-            <a:extLst>
-              <a:ext uri="{FF2B5EF4-FFF2-40B4-BE49-F238E27FC236}">
-                <a16:creationId xmlns:a16="http://schemas.microsoft.com/office/drawing/2014/main" id="{D2A649A9-20E6-4FAA-A93C-A1B988BAA332}"/>
-              </a:ext>
-            </a:extLst>
-          </p:cNvPr>
-          <p:cNvSpPr>
-            <a:spLocks noGrp="1"/>
-          </p:cNvSpPr>
-          <p:nvPr>
-            <p:ph type="body" sz="quarter" idx="18"/>
-          </p:nvPr>
-        </p:nvSpPr>
-        <p:spPr/>
-        <p:txBody>
-          <a:bodyPr/>
-          <a:lstStyle/>
-          <a:p>
-            <a:endParaRPr lang="LID4096"/>
-          </a:p>
-        </p:txBody>
-      </p:sp>
-      <p:sp>
-        <p:nvSpPr>
-          <p:cNvPr id="36" name="Text Placeholder 35">
-            <a:extLst>
-              <a:ext uri="{FF2B5EF4-FFF2-40B4-BE49-F238E27FC236}">
-                <a16:creationId xmlns:a16="http://schemas.microsoft.com/office/drawing/2014/main" id="{9C532507-016B-46EB-9E09-0B8690DB715B}"/>
-              </a:ext>
-            </a:extLst>
-          </p:cNvPr>
-          <p:cNvSpPr>
-            <a:spLocks noGrp="1"/>
-          </p:cNvSpPr>
-          <p:nvPr>
-            <p:ph type="body" sz="quarter" idx="19"/>
-          </p:nvPr>
-        </p:nvSpPr>
-        <p:spPr/>
-        <p:txBody>
-          <a:bodyPr/>
-          <a:lstStyle/>
-          <a:p>
-            <a:r>
-              <a:rPr lang="en-US" dirty="0"/>
-              <a:t>Functional programming</a:t>
-            </a:r>
-            <a:endParaRPr lang="LID4096" dirty="0"/>
-          </a:p>
-        </p:txBody>
-      </p:sp>
     </p:spTree>
     <p:extLst>
       <p:ext uri="{BB962C8B-B14F-4D97-AF65-F5344CB8AC3E}">
-        <p14:creationId xmlns:p14="http://schemas.microsoft.com/office/powerpoint/2010/main" val="675312299"/>
+        <p14:creationId xmlns:p14="http://schemas.microsoft.com/office/powerpoint/2010/main" val="1919212033"/>
       </p:ext>
     </p:extLst>
   </p:cSld>
@@ -7740,12 +8686,8 @@
           </a:p>
           <a:p>
             <a:r>
-              <a:rPr lang="en-US" dirty="0" err="1"/>
-              <a:t>dotnet</a:t>
-            </a:r>
-            <a:r>
-              <a:rPr lang="en-US" dirty="0"/>
-              <a:t> as </a:t>
+              <a:rPr lang="en-US" dirty="0"/>
+              <a:t>.NET as </a:t>
             </a:r>
             <a:r>
               <a:rPr lang="en-US" dirty="0" err="1"/>
@@ -7760,7 +8702,7 @@
             <a:pPr lvl="1"/>
             <a:r>
               <a:rPr lang="en-US" dirty="0"/>
-              <a:t>iron ruby</a:t>
+              <a:t>Iron ruby</a:t>
             </a:r>
           </a:p>
           <a:p>
@@ -7877,13 +8819,8 @@
           <a:p>
             <a:r>
               <a:rPr lang="en-US" dirty="0"/>
-              <a:t>Convenience </a:t>
-            </a:r>
-            <a:r>
-              <a:rPr lang="en-US" sz="800" dirty="0"/>
-              <a:t>(see language features)</a:t>
-            </a:r>
-            <a:endParaRPr lang="en-US" dirty="0"/>
+              <a:t>Convenience</a:t>
+            </a:r>
           </a:p>
           <a:p>
             <a:r>

</xml_diff>